<commit_message>
Added initial server project. Furthered development of final project power point.
</commit_message>
<xml_diff>
--- a/final-project.pptx
+++ b/final-project.pptx
@@ -5253,6 +5253,13 @@
   <p:clrMapOvr>
     <a:masterClrMapping/>
   </p:clrMapOvr>
+  <p:timing>
+    <p:tnLst>
+      <p:par>
+        <p:cTn xmlns:p14="http://schemas.microsoft.com/office/powerpoint/2010/main" id="1" dur="indefinite" restart="never" nodeType="tmRoot"/>
+      </p:par>
+    </p:tnLst>
+  </p:timing>
 </p:sld>
 </file>
 
@@ -5288,7 +5295,129 @@
           <a:bodyPr/>
           <a:lstStyle/>
           <a:p>
-            <a:endParaRPr lang="en-US"/>
+            <a:r>
+              <a:rPr lang="en-US" dirty="0" err="1" smtClean="0"/>
+              <a:t>Github</a:t>
+            </a:r>
+            <a:r>
+              <a:rPr lang="en-US" dirty="0" smtClean="0"/>
+              <a:t>: </a:t>
+            </a:r>
+            <a:r>
+              <a:rPr lang="en-US" dirty="0" smtClean="0">
+                <a:hlinkClick r:id="rId2"/>
+              </a:rPr>
+              <a:t>https</a:t>
+            </a:r>
+            <a:r>
+              <a:rPr lang="en-US" dirty="0">
+                <a:hlinkClick r:id="rId2"/>
+              </a:rPr>
+              <a:t>://github.com/hswope/</a:t>
+            </a:r>
+            <a:r>
+              <a:rPr lang="en-US" dirty="0" smtClean="0">
+                <a:hlinkClick r:id="rId2"/>
+              </a:rPr>
+              <a:t>chatnoir</a:t>
+            </a:r>
+            <a:endParaRPr lang="en-US" dirty="0" smtClean="0"/>
+          </a:p>
+          <a:p>
+            <a:r>
+              <a:rPr lang="en-US" dirty="0" err="1" smtClean="0"/>
+              <a:t>Kotlin</a:t>
+            </a:r>
+            <a:r>
+              <a:rPr lang="en-US" dirty="0"/>
+              <a:t>: </a:t>
+            </a:r>
+            <a:r>
+              <a:rPr lang="en-US" dirty="0">
+                <a:hlinkClick r:id="rId3"/>
+              </a:rPr>
+              <a:t>https://kotlinlang.org</a:t>
+            </a:r>
+            <a:r>
+              <a:rPr lang="en-US" dirty="0" smtClean="0">
+                <a:hlinkClick r:id="rId3"/>
+              </a:rPr>
+              <a:t>/</a:t>
+            </a:r>
+            <a:endParaRPr lang="en-US" dirty="0" smtClean="0"/>
+          </a:p>
+          <a:p>
+            <a:r>
+              <a:rPr lang="en-US" dirty="0" err="1" smtClean="0"/>
+              <a:t>PostgresSQL</a:t>
+            </a:r>
+            <a:r>
+              <a:rPr lang="en-US" dirty="0"/>
+              <a:t>: </a:t>
+            </a:r>
+            <a:r>
+              <a:rPr lang="en-US" dirty="0">
+                <a:hlinkClick r:id="rId4"/>
+              </a:rPr>
+              <a:t>https://www.postgresql.org</a:t>
+            </a:r>
+            <a:r>
+              <a:rPr lang="en-US" dirty="0" smtClean="0">
+                <a:hlinkClick r:id="rId4"/>
+              </a:rPr>
+              <a:t>/</a:t>
+            </a:r>
+            <a:endParaRPr lang="en-US" dirty="0"/>
+          </a:p>
+          <a:p>
+            <a:r>
+              <a:rPr lang="en-US" dirty="0" smtClean="0"/>
+              <a:t>Jet </a:t>
+            </a:r>
+            <a:r>
+              <a:rPr lang="en-US" dirty="0"/>
+              <a:t>Brains: </a:t>
+            </a:r>
+            <a:r>
+              <a:rPr lang="en-US" dirty="0">
+                <a:hlinkClick r:id="rId5"/>
+              </a:rPr>
+              <a:t>https://www.jetbrains.com</a:t>
+            </a:r>
+            <a:r>
+              <a:rPr lang="en-US" dirty="0" smtClean="0">
+                <a:hlinkClick r:id="rId5"/>
+              </a:rPr>
+              <a:t>/</a:t>
+            </a:r>
+            <a:endParaRPr lang="en-US" dirty="0" smtClean="0"/>
+          </a:p>
+          <a:p>
+            <a:r>
+              <a:rPr lang="en-US" dirty="0" smtClean="0"/>
+              <a:t>Smart </a:t>
+            </a:r>
+            <a:r>
+              <a:rPr lang="en-US" dirty="0" err="1" smtClean="0"/>
+              <a:t>Git</a:t>
+            </a:r>
+            <a:r>
+              <a:rPr lang="en-US" dirty="0"/>
+              <a:t>: </a:t>
+            </a:r>
+            <a:r>
+              <a:rPr lang="en-US" dirty="0">
+                <a:hlinkClick r:id="rId6"/>
+              </a:rPr>
+              <a:t>http://www.syntevo.com/smartgit</a:t>
+            </a:r>
+            <a:r>
+              <a:rPr lang="en-US" dirty="0" smtClean="0">
+                <a:hlinkClick r:id="rId6"/>
+              </a:rPr>
+              <a:t>/</a:t>
+            </a:r>
+            <a:endParaRPr lang="en-US" dirty="0" smtClean="0"/>
           </a:p>
         </p:txBody>
       </p:sp>
@@ -5306,6 +5435,108 @@
         <p:txBody>
           <a:bodyPr/>
           <a:lstStyle/>
+          <a:p>
+            <a:r>
+              <a:rPr lang="en-US" dirty="0" smtClean="0"/>
+              <a:t>Wrap Up</a:t>
+            </a:r>
+            <a:endParaRPr lang="en-US" dirty="0"/>
+          </a:p>
+        </p:txBody>
+      </p:sp>
+      <p:sp>
+        <p:nvSpPr>
+          <p:cNvPr id="4" name="Title 2"/>
+          <p:cNvSpPr txBox="1">
+            <a:spLocks/>
+          </p:cNvSpPr>
+          <p:nvPr/>
+        </p:nvSpPr>
+        <p:spPr>
+          <a:xfrm>
+            <a:off x="615392" y="5599037"/>
+            <a:ext cx="7756263" cy="1054250"/>
+          </a:xfrm>
+          <a:prstGeom prst="rect">
+            <a:avLst/>
+          </a:prstGeom>
+        </p:spPr>
+        <p:txBody>
+          <a:bodyPr vert="horz" lIns="91440" tIns="45720" rIns="91440" bIns="45720" rtlCol="0" anchor="ctr">
+            <a:noAutofit/>
+          </a:bodyPr>
+          <a:lstStyle>
+            <a:lvl1pPr algn="ctr" defTabSz="914400" rtl="0" eaLnBrk="1" latinLnBrk="0" hangingPunct="1">
+              <a:spcBef>
+                <a:spcPct val="0"/>
+              </a:spcBef>
+              <a:buNone/>
+              <a:defRPr sz="5400" kern="1200">
+                <a:solidFill>
+                  <a:schemeClr val="tx2"/>
+                </a:solidFill>
+                <a:latin typeface="+mj-lt"/>
+                <a:ea typeface="+mj-ea"/>
+                <a:cs typeface="+mj-cs"/>
+              </a:defRPr>
+            </a:lvl1pPr>
+            <a:lvl2pPr eaLnBrk="1" hangingPunct="1">
+              <a:defRPr>
+                <a:solidFill>
+                  <a:schemeClr val="tx2"/>
+                </a:solidFill>
+              </a:defRPr>
+            </a:lvl2pPr>
+            <a:lvl3pPr eaLnBrk="1" hangingPunct="1">
+              <a:defRPr>
+                <a:solidFill>
+                  <a:schemeClr val="tx2"/>
+                </a:solidFill>
+              </a:defRPr>
+            </a:lvl3pPr>
+            <a:lvl4pPr eaLnBrk="1" hangingPunct="1">
+              <a:defRPr>
+                <a:solidFill>
+                  <a:schemeClr val="tx2"/>
+                </a:solidFill>
+              </a:defRPr>
+            </a:lvl4pPr>
+            <a:lvl5pPr eaLnBrk="1" hangingPunct="1">
+              <a:defRPr>
+                <a:solidFill>
+                  <a:schemeClr val="tx2"/>
+                </a:solidFill>
+              </a:defRPr>
+            </a:lvl5pPr>
+            <a:lvl6pPr eaLnBrk="1" hangingPunct="1">
+              <a:defRPr>
+                <a:solidFill>
+                  <a:schemeClr val="tx2"/>
+                </a:solidFill>
+              </a:defRPr>
+            </a:lvl6pPr>
+            <a:lvl7pPr eaLnBrk="1" hangingPunct="1">
+              <a:defRPr>
+                <a:solidFill>
+                  <a:schemeClr val="tx2"/>
+                </a:solidFill>
+              </a:defRPr>
+            </a:lvl7pPr>
+            <a:lvl8pPr eaLnBrk="1" hangingPunct="1">
+              <a:defRPr>
+                <a:solidFill>
+                  <a:schemeClr val="tx2"/>
+                </a:solidFill>
+              </a:defRPr>
+            </a:lvl8pPr>
+            <a:lvl9pPr eaLnBrk="1" hangingPunct="1">
+              <a:defRPr>
+                <a:solidFill>
+                  <a:schemeClr val="tx2"/>
+                </a:solidFill>
+              </a:defRPr>
+            </a:lvl9pPr>
+          </a:lstStyle>
           <a:p>
             <a:r>
               <a:rPr lang="en-US" dirty="0" smtClean="0"/>
@@ -5325,6 +5556,13 @@
   <p:clrMapOvr>
     <a:masterClrMapping/>
   </p:clrMapOvr>
+  <p:timing>
+    <p:tnLst>
+      <p:par>
+        <p:cTn xmlns:p14="http://schemas.microsoft.com/office/powerpoint/2010/main" id="1" dur="indefinite" restart="never" nodeType="tmRoot"/>
+      </p:par>
+    </p:tnLst>
+  </p:timing>
 </p:sld>
 </file>
 

</xml_diff>

<commit_message>
Made additions to final project. Now using User as the TreeItem type. Setup conversation.
</commit_message>
<xml_diff>
--- a/final-project.pptx
+++ b/final-project.pptx
@@ -4,15 +4,24 @@
   <p:sldMasterIdLst>
     <p:sldMasterId id="2147483744" r:id="rId1"/>
   </p:sldMasterIdLst>
+  <p:notesMasterIdLst>
+    <p:notesMasterId r:id="rId16"/>
+  </p:notesMasterIdLst>
   <p:sldIdLst>
     <p:sldId id="256" r:id="rId2"/>
     <p:sldId id="257" r:id="rId3"/>
     <p:sldId id="258" r:id="rId4"/>
     <p:sldId id="259" r:id="rId5"/>
     <p:sldId id="260" r:id="rId6"/>
-    <p:sldId id="261" r:id="rId7"/>
-    <p:sldId id="263" r:id="rId8"/>
-    <p:sldId id="264" r:id="rId9"/>
+    <p:sldId id="272" r:id="rId7"/>
+    <p:sldId id="266" r:id="rId8"/>
+    <p:sldId id="270" r:id="rId9"/>
+    <p:sldId id="267" r:id="rId10"/>
+    <p:sldId id="268" r:id="rId11"/>
+    <p:sldId id="269" r:id="rId12"/>
+    <p:sldId id="261" r:id="rId13"/>
+    <p:sldId id="263" r:id="rId14"/>
+    <p:sldId id="264" r:id="rId15"/>
   </p:sldIdLst>
   <p:sldSz cx="9144000" cy="6858000" type="screen4x3"/>
   <p:notesSz cx="6858000" cy="9144000"/>
@@ -133,6 +142,12 @@
         <p14:section name="Tool Set" id="{6EFF1220-E294-4B4A-BDF5-2D6604F612CE}">
           <p14:sldIdLst>
             <p14:sldId id="260"/>
+            <p14:sldId id="272"/>
+            <p14:sldId id="266"/>
+            <p14:sldId id="270"/>
+            <p14:sldId id="267"/>
+            <p14:sldId id="268"/>
+            <p14:sldId id="269"/>
           </p14:sldIdLst>
         </p14:section>
         <p14:section name="Software Techniques" id="{5C39C1DC-D91E-1942-B634-3FB3574CC69D}">
@@ -154,6 +169,1031 @@
     </p:ext>
   </p:extLst>
 </p:presentation>
+</file>
+
+<file path=ppt/notesMasters/notesMaster1.xml><?xml version="1.0" encoding="utf-8"?>
+<p:notesMaster xmlns:a="http://schemas.openxmlformats.org/drawingml/2006/main" xmlns:r="http://schemas.openxmlformats.org/officeDocument/2006/relationships" xmlns:p="http://schemas.openxmlformats.org/presentationml/2006/main">
+  <p:cSld>
+    <p:bg>
+      <p:bgRef idx="1001">
+        <a:schemeClr val="bg1"/>
+      </p:bgRef>
+    </p:bg>
+    <p:spTree>
+      <p:nvGrpSpPr>
+        <p:cNvPr id="1" name=""/>
+        <p:cNvGrpSpPr/>
+        <p:nvPr/>
+      </p:nvGrpSpPr>
+      <p:grpSpPr>
+        <a:xfrm>
+          <a:off x="0" y="0"/>
+          <a:ext cx="0" cy="0"/>
+          <a:chOff x="0" y="0"/>
+          <a:chExt cx="0" cy="0"/>
+        </a:xfrm>
+      </p:grpSpPr>
+      <p:sp>
+        <p:nvSpPr>
+          <p:cNvPr id="2" name="Header Placeholder 1"/>
+          <p:cNvSpPr>
+            <a:spLocks noGrp="1"/>
+          </p:cNvSpPr>
+          <p:nvPr>
+            <p:ph type="hdr" sz="quarter"/>
+          </p:nvPr>
+        </p:nvSpPr>
+        <p:spPr>
+          <a:xfrm>
+            <a:off x="0" y="0"/>
+            <a:ext cx="2971800" cy="457200"/>
+          </a:xfrm>
+          <a:prstGeom prst="rect">
+            <a:avLst/>
+          </a:prstGeom>
+        </p:spPr>
+        <p:txBody>
+          <a:bodyPr vert="horz" lIns="91440" tIns="45720" rIns="91440" bIns="45720" rtlCol="0"/>
+          <a:lstStyle>
+            <a:lvl1pPr algn="l">
+              <a:defRPr sz="1200"/>
+            </a:lvl1pPr>
+          </a:lstStyle>
+          <a:p>
+            <a:endParaRPr lang="en-US"/>
+          </a:p>
+        </p:txBody>
+      </p:sp>
+      <p:sp>
+        <p:nvSpPr>
+          <p:cNvPr id="3" name="Date Placeholder 2"/>
+          <p:cNvSpPr>
+            <a:spLocks noGrp="1"/>
+          </p:cNvSpPr>
+          <p:nvPr>
+            <p:ph type="dt" idx="1"/>
+          </p:nvPr>
+        </p:nvSpPr>
+        <p:spPr>
+          <a:xfrm>
+            <a:off x="3884613" y="0"/>
+            <a:ext cx="2971800" cy="457200"/>
+          </a:xfrm>
+          <a:prstGeom prst="rect">
+            <a:avLst/>
+          </a:prstGeom>
+        </p:spPr>
+        <p:txBody>
+          <a:bodyPr vert="horz" lIns="91440" tIns="45720" rIns="91440" bIns="45720" rtlCol="0"/>
+          <a:lstStyle>
+            <a:lvl1pPr algn="r">
+              <a:defRPr sz="1200"/>
+            </a:lvl1pPr>
+          </a:lstStyle>
+          <a:p>
+            <a:fld id="{AE9B0B72-E1AB-5247-8BA4-E16622CBA4F5}" type="datetimeFigureOut">
+              <a:rPr lang="en-US" smtClean="0"/>
+              <a:t>12/4/16</a:t>
+            </a:fld>
+            <a:endParaRPr lang="en-US"/>
+          </a:p>
+        </p:txBody>
+      </p:sp>
+      <p:sp>
+        <p:nvSpPr>
+          <p:cNvPr id="4" name="Slide Image Placeholder 3"/>
+          <p:cNvSpPr>
+            <a:spLocks noGrp="1" noRot="1" noChangeAspect="1"/>
+          </p:cNvSpPr>
+          <p:nvPr>
+            <p:ph type="sldImg" idx="2"/>
+          </p:nvPr>
+        </p:nvSpPr>
+        <p:spPr>
+          <a:xfrm>
+            <a:off x="1143000" y="685800"/>
+            <a:ext cx="4572000" cy="3429000"/>
+          </a:xfrm>
+          <a:prstGeom prst="rect">
+            <a:avLst/>
+          </a:prstGeom>
+          <a:noFill/>
+          <a:ln w="12700">
+            <a:solidFill>
+              <a:prstClr val="black"/>
+            </a:solidFill>
+          </a:ln>
+        </p:spPr>
+        <p:txBody>
+          <a:bodyPr vert="horz" lIns="91440" tIns="45720" rIns="91440" bIns="45720" rtlCol="0" anchor="ctr"/>
+          <a:lstStyle/>
+          <a:p>
+            <a:endParaRPr lang="en-US"/>
+          </a:p>
+        </p:txBody>
+      </p:sp>
+      <p:sp>
+        <p:nvSpPr>
+          <p:cNvPr id="5" name="Notes Placeholder 4"/>
+          <p:cNvSpPr>
+            <a:spLocks noGrp="1"/>
+          </p:cNvSpPr>
+          <p:nvPr>
+            <p:ph type="body" sz="quarter" idx="3"/>
+          </p:nvPr>
+        </p:nvSpPr>
+        <p:spPr>
+          <a:xfrm>
+            <a:off x="685800" y="4343400"/>
+            <a:ext cx="5486400" cy="4114800"/>
+          </a:xfrm>
+          <a:prstGeom prst="rect">
+            <a:avLst/>
+          </a:prstGeom>
+        </p:spPr>
+        <p:txBody>
+          <a:bodyPr vert="horz" lIns="91440" tIns="45720" rIns="91440" bIns="45720" rtlCol="0"/>
+          <a:lstStyle/>
+          <a:p>
+            <a:pPr lvl="0"/>
+            <a:r>
+              <a:rPr lang="en-US" smtClean="0"/>
+              <a:t>Click to edit Master text styles</a:t>
+            </a:r>
+          </a:p>
+          <a:p>
+            <a:pPr lvl="1"/>
+            <a:r>
+              <a:rPr lang="en-US" smtClean="0"/>
+              <a:t>Second level</a:t>
+            </a:r>
+          </a:p>
+          <a:p>
+            <a:pPr lvl="2"/>
+            <a:r>
+              <a:rPr lang="en-US" smtClean="0"/>
+              <a:t>Third level</a:t>
+            </a:r>
+          </a:p>
+          <a:p>
+            <a:pPr lvl="3"/>
+            <a:r>
+              <a:rPr lang="en-US" smtClean="0"/>
+              <a:t>Fourth level</a:t>
+            </a:r>
+          </a:p>
+          <a:p>
+            <a:pPr lvl="4"/>
+            <a:r>
+              <a:rPr lang="en-US" smtClean="0"/>
+              <a:t>Fifth level</a:t>
+            </a:r>
+            <a:endParaRPr lang="en-US"/>
+          </a:p>
+        </p:txBody>
+      </p:sp>
+      <p:sp>
+        <p:nvSpPr>
+          <p:cNvPr id="6" name="Footer Placeholder 5"/>
+          <p:cNvSpPr>
+            <a:spLocks noGrp="1"/>
+          </p:cNvSpPr>
+          <p:nvPr>
+            <p:ph type="ftr" sz="quarter" idx="4"/>
+          </p:nvPr>
+        </p:nvSpPr>
+        <p:spPr>
+          <a:xfrm>
+            <a:off x="0" y="8685213"/>
+            <a:ext cx="2971800" cy="457200"/>
+          </a:xfrm>
+          <a:prstGeom prst="rect">
+            <a:avLst/>
+          </a:prstGeom>
+        </p:spPr>
+        <p:txBody>
+          <a:bodyPr vert="horz" lIns="91440" tIns="45720" rIns="91440" bIns="45720" rtlCol="0" anchor="b"/>
+          <a:lstStyle>
+            <a:lvl1pPr algn="l">
+              <a:defRPr sz="1200"/>
+            </a:lvl1pPr>
+          </a:lstStyle>
+          <a:p>
+            <a:endParaRPr lang="en-US"/>
+          </a:p>
+        </p:txBody>
+      </p:sp>
+      <p:sp>
+        <p:nvSpPr>
+          <p:cNvPr id="7" name="Slide Number Placeholder 6"/>
+          <p:cNvSpPr>
+            <a:spLocks noGrp="1"/>
+          </p:cNvSpPr>
+          <p:nvPr>
+            <p:ph type="sldNum" sz="quarter" idx="5"/>
+          </p:nvPr>
+        </p:nvSpPr>
+        <p:spPr>
+          <a:xfrm>
+            <a:off x="3884613" y="8685213"/>
+            <a:ext cx="2971800" cy="457200"/>
+          </a:xfrm>
+          <a:prstGeom prst="rect">
+            <a:avLst/>
+          </a:prstGeom>
+        </p:spPr>
+        <p:txBody>
+          <a:bodyPr vert="horz" lIns="91440" tIns="45720" rIns="91440" bIns="45720" rtlCol="0" anchor="b"/>
+          <a:lstStyle>
+            <a:lvl1pPr algn="r">
+              <a:defRPr sz="1200"/>
+            </a:lvl1pPr>
+          </a:lstStyle>
+          <a:p>
+            <a:fld id="{343EC50C-9F72-2145-B639-B6AAF286F007}" type="slidenum">
+              <a:rPr lang="en-US" smtClean="0"/>
+              <a:t>‹#›</a:t>
+            </a:fld>
+            <a:endParaRPr lang="en-US"/>
+          </a:p>
+        </p:txBody>
+      </p:sp>
+    </p:spTree>
+    <p:extLst>
+      <p:ext uri="{BB962C8B-B14F-4D97-AF65-F5344CB8AC3E}">
+        <p14:creationId xmlns:p14="http://schemas.microsoft.com/office/powerpoint/2010/main" val="1472322118"/>
+      </p:ext>
+    </p:extLst>
+  </p:cSld>
+  <p:clrMap bg1="lt1" tx1="dk1" bg2="lt2" tx2="dk2" accent1="accent1" accent2="accent2" accent3="accent3" accent4="accent4" accent5="accent5" accent6="accent6" hlink="hlink" folHlink="folHlink"/>
+  <p:notesStyle>
+    <a:lvl1pPr marL="0" algn="l" defTabSz="457200" rtl="0" eaLnBrk="1" latinLnBrk="0" hangingPunct="1">
+      <a:defRPr sz="1200" kern="1200">
+        <a:solidFill>
+          <a:schemeClr val="tx1"/>
+        </a:solidFill>
+        <a:latin typeface="+mn-lt"/>
+        <a:ea typeface="+mn-ea"/>
+        <a:cs typeface="+mn-cs"/>
+      </a:defRPr>
+    </a:lvl1pPr>
+    <a:lvl2pPr marL="457200" algn="l" defTabSz="457200" rtl="0" eaLnBrk="1" latinLnBrk="0" hangingPunct="1">
+      <a:defRPr sz="1200" kern="1200">
+        <a:solidFill>
+          <a:schemeClr val="tx1"/>
+        </a:solidFill>
+        <a:latin typeface="+mn-lt"/>
+        <a:ea typeface="+mn-ea"/>
+        <a:cs typeface="+mn-cs"/>
+      </a:defRPr>
+    </a:lvl2pPr>
+    <a:lvl3pPr marL="914400" algn="l" defTabSz="457200" rtl="0" eaLnBrk="1" latinLnBrk="0" hangingPunct="1">
+      <a:defRPr sz="1200" kern="1200">
+        <a:solidFill>
+          <a:schemeClr val="tx1"/>
+        </a:solidFill>
+        <a:latin typeface="+mn-lt"/>
+        <a:ea typeface="+mn-ea"/>
+        <a:cs typeface="+mn-cs"/>
+      </a:defRPr>
+    </a:lvl3pPr>
+    <a:lvl4pPr marL="1371600" algn="l" defTabSz="457200" rtl="0" eaLnBrk="1" latinLnBrk="0" hangingPunct="1">
+      <a:defRPr sz="1200" kern="1200">
+        <a:solidFill>
+          <a:schemeClr val="tx1"/>
+        </a:solidFill>
+        <a:latin typeface="+mn-lt"/>
+        <a:ea typeface="+mn-ea"/>
+        <a:cs typeface="+mn-cs"/>
+      </a:defRPr>
+    </a:lvl4pPr>
+    <a:lvl5pPr marL="1828800" algn="l" defTabSz="457200" rtl="0" eaLnBrk="1" latinLnBrk="0" hangingPunct="1">
+      <a:defRPr sz="1200" kern="1200">
+        <a:solidFill>
+          <a:schemeClr val="tx1"/>
+        </a:solidFill>
+        <a:latin typeface="+mn-lt"/>
+        <a:ea typeface="+mn-ea"/>
+        <a:cs typeface="+mn-cs"/>
+      </a:defRPr>
+    </a:lvl5pPr>
+    <a:lvl6pPr marL="2286000" algn="l" defTabSz="457200" rtl="0" eaLnBrk="1" latinLnBrk="0" hangingPunct="1">
+      <a:defRPr sz="1200" kern="1200">
+        <a:solidFill>
+          <a:schemeClr val="tx1"/>
+        </a:solidFill>
+        <a:latin typeface="+mn-lt"/>
+        <a:ea typeface="+mn-ea"/>
+        <a:cs typeface="+mn-cs"/>
+      </a:defRPr>
+    </a:lvl6pPr>
+    <a:lvl7pPr marL="2743200" algn="l" defTabSz="457200" rtl="0" eaLnBrk="1" latinLnBrk="0" hangingPunct="1">
+      <a:defRPr sz="1200" kern="1200">
+        <a:solidFill>
+          <a:schemeClr val="tx1"/>
+        </a:solidFill>
+        <a:latin typeface="+mn-lt"/>
+        <a:ea typeface="+mn-ea"/>
+        <a:cs typeface="+mn-cs"/>
+      </a:defRPr>
+    </a:lvl7pPr>
+    <a:lvl8pPr marL="3200400" algn="l" defTabSz="457200" rtl="0" eaLnBrk="1" latinLnBrk="0" hangingPunct="1">
+      <a:defRPr sz="1200" kern="1200">
+        <a:solidFill>
+          <a:schemeClr val="tx1"/>
+        </a:solidFill>
+        <a:latin typeface="+mn-lt"/>
+        <a:ea typeface="+mn-ea"/>
+        <a:cs typeface="+mn-cs"/>
+      </a:defRPr>
+    </a:lvl8pPr>
+    <a:lvl9pPr marL="3657600" algn="l" defTabSz="457200" rtl="0" eaLnBrk="1" latinLnBrk="0" hangingPunct="1">
+      <a:defRPr sz="1200" kern="1200">
+        <a:solidFill>
+          <a:schemeClr val="tx1"/>
+        </a:solidFill>
+        <a:latin typeface="+mn-lt"/>
+        <a:ea typeface="+mn-ea"/>
+        <a:cs typeface="+mn-cs"/>
+      </a:defRPr>
+    </a:lvl9pPr>
+  </p:notesStyle>
+</p:notesMaster>
+</file>
+
+<file path=ppt/notesSlides/notesSlide1.xml><?xml version="1.0" encoding="utf-8"?>
+<p:notes xmlns:a="http://schemas.openxmlformats.org/drawingml/2006/main" xmlns:r="http://schemas.openxmlformats.org/officeDocument/2006/relationships" xmlns:p="http://schemas.openxmlformats.org/presentationml/2006/main">
+  <p:cSld>
+    <p:spTree>
+      <p:nvGrpSpPr>
+        <p:cNvPr id="1" name=""/>
+        <p:cNvGrpSpPr/>
+        <p:nvPr/>
+      </p:nvGrpSpPr>
+      <p:grpSpPr>
+        <a:xfrm>
+          <a:off x="0" y="0"/>
+          <a:ext cx="0" cy="0"/>
+          <a:chOff x="0" y="0"/>
+          <a:chExt cx="0" cy="0"/>
+        </a:xfrm>
+      </p:grpSpPr>
+      <p:sp>
+        <p:nvSpPr>
+          <p:cNvPr id="2" name="Slide Image Placeholder 1"/>
+          <p:cNvSpPr>
+            <a:spLocks noGrp="1" noRot="1" noChangeAspect="1"/>
+          </p:cNvSpPr>
+          <p:nvPr>
+            <p:ph type="sldImg"/>
+          </p:nvPr>
+        </p:nvSpPr>
+        <p:spPr/>
+      </p:sp>
+      <p:sp>
+        <p:nvSpPr>
+          <p:cNvPr id="3" name="Notes Placeholder 2"/>
+          <p:cNvSpPr>
+            <a:spLocks noGrp="1"/>
+          </p:cNvSpPr>
+          <p:nvPr>
+            <p:ph type="body" idx="1"/>
+          </p:nvPr>
+        </p:nvSpPr>
+        <p:spPr/>
+        <p:txBody>
+          <a:bodyPr/>
+          <a:lstStyle/>
+          <a:p>
+            <a:pPr marL="171450" indent="-171450">
+              <a:buFont typeface="Arial"/>
+              <a:buChar char="•"/>
+            </a:pPr>
+            <a:r>
+              <a:rPr lang="en-US" dirty="0" err="1" smtClean="0"/>
+              <a:t>JetBrains</a:t>
+            </a:r>
+            <a:r>
+              <a:rPr lang="en-US" dirty="0" smtClean="0"/>
+              <a:t> Java IDE</a:t>
+            </a:r>
+          </a:p>
+          <a:p>
+            <a:pPr marL="171450" indent="-171450">
+              <a:buFont typeface="Arial"/>
+              <a:buChar char="•"/>
+            </a:pPr>
+            <a:r>
+              <a:rPr lang="en-US" dirty="0" smtClean="0"/>
+              <a:t>Supports all aspects of the build process</a:t>
+            </a:r>
+          </a:p>
+          <a:p>
+            <a:pPr marL="628650" lvl="1" indent="-171450">
+              <a:buFont typeface="Arial"/>
+              <a:buChar char="•"/>
+            </a:pPr>
+            <a:r>
+              <a:rPr lang="en-US" dirty="0" smtClean="0"/>
+              <a:t>Coding - edit, compile build</a:t>
+            </a:r>
+          </a:p>
+          <a:p>
+            <a:pPr marL="628650" lvl="1" indent="-171450">
+              <a:buFont typeface="Arial"/>
+              <a:buChar char="•"/>
+            </a:pPr>
+            <a:r>
+              <a:rPr lang="en-US" dirty="0" smtClean="0"/>
+              <a:t>Standard library support (</a:t>
+            </a:r>
+            <a:r>
+              <a:rPr lang="en-US" dirty="0" err="1" smtClean="0"/>
+              <a:t>eg</a:t>
+            </a:r>
+            <a:r>
+              <a:rPr lang="en-US" dirty="0" smtClean="0"/>
+              <a:t>. Spring)</a:t>
+            </a:r>
+          </a:p>
+          <a:p>
+            <a:pPr marL="628650" lvl="1" indent="-171450">
+              <a:buFont typeface="Arial"/>
+              <a:buChar char="•"/>
+            </a:pPr>
+            <a:r>
+              <a:rPr lang="en-US" dirty="0" smtClean="0"/>
+              <a:t>Standard tool support (</a:t>
+            </a:r>
+            <a:r>
+              <a:rPr lang="en-US" dirty="0" err="1" smtClean="0"/>
+              <a:t>eg</a:t>
+            </a:r>
+            <a:r>
+              <a:rPr lang="en-US" dirty="0" smtClean="0"/>
+              <a:t>. </a:t>
+            </a:r>
+            <a:r>
+              <a:rPr lang="en-US" dirty="0" err="1" smtClean="0"/>
+              <a:t>Gradle</a:t>
+            </a:r>
+            <a:r>
+              <a:rPr lang="en-US" dirty="0" smtClean="0"/>
+              <a:t>)</a:t>
+            </a:r>
+          </a:p>
+          <a:p>
+            <a:pPr marL="628650" lvl="1" indent="-171450">
+              <a:buFont typeface="Arial"/>
+              <a:buChar char="•"/>
+            </a:pPr>
+            <a:r>
+              <a:rPr lang="en-US" dirty="0" smtClean="0"/>
+              <a:t>Source control interaction</a:t>
+            </a:r>
+          </a:p>
+          <a:p>
+            <a:pPr marL="628650" lvl="1" indent="-171450">
+              <a:buFont typeface="Arial"/>
+              <a:buChar char="•"/>
+            </a:pPr>
+            <a:r>
+              <a:rPr lang="en-US" dirty="0" smtClean="0"/>
+              <a:t>Database modeling and interaction</a:t>
+            </a:r>
+          </a:p>
+          <a:p>
+            <a:pPr marL="171450" indent="-171450">
+              <a:buFont typeface="Arial"/>
+              <a:buChar char="•"/>
+            </a:pPr>
+            <a:endParaRPr lang="en-US" dirty="0"/>
+          </a:p>
+        </p:txBody>
+      </p:sp>
+      <p:sp>
+        <p:nvSpPr>
+          <p:cNvPr id="4" name="Slide Number Placeholder 3"/>
+          <p:cNvSpPr>
+            <a:spLocks noGrp="1"/>
+          </p:cNvSpPr>
+          <p:nvPr>
+            <p:ph type="sldNum" sz="quarter" idx="10"/>
+          </p:nvPr>
+        </p:nvSpPr>
+        <p:spPr/>
+        <p:txBody>
+          <a:bodyPr/>
+          <a:lstStyle/>
+          <a:p>
+            <a:fld id="{343EC50C-9F72-2145-B639-B6AAF286F007}" type="slidenum">
+              <a:rPr lang="en-US" smtClean="0"/>
+              <a:t>6</a:t>
+            </a:fld>
+            <a:endParaRPr lang="en-US"/>
+          </a:p>
+        </p:txBody>
+      </p:sp>
+    </p:spTree>
+    <p:extLst>
+      <p:ext uri="{BB962C8B-B14F-4D97-AF65-F5344CB8AC3E}">
+        <p14:creationId xmlns:p14="http://schemas.microsoft.com/office/powerpoint/2010/main" val="1728622765"/>
+      </p:ext>
+    </p:extLst>
+  </p:cSld>
+  <p:clrMapOvr>
+    <a:masterClrMapping/>
+  </p:clrMapOvr>
+</p:notes>
+</file>
+
+<file path=ppt/notesSlides/notesSlide2.xml><?xml version="1.0" encoding="utf-8"?>
+<p:notes xmlns:a="http://schemas.openxmlformats.org/drawingml/2006/main" xmlns:r="http://schemas.openxmlformats.org/officeDocument/2006/relationships" xmlns:p="http://schemas.openxmlformats.org/presentationml/2006/main">
+  <p:cSld>
+    <p:spTree>
+      <p:nvGrpSpPr>
+        <p:cNvPr id="1" name=""/>
+        <p:cNvGrpSpPr/>
+        <p:nvPr/>
+      </p:nvGrpSpPr>
+      <p:grpSpPr>
+        <a:xfrm>
+          <a:off x="0" y="0"/>
+          <a:ext cx="0" cy="0"/>
+          <a:chOff x="0" y="0"/>
+          <a:chExt cx="0" cy="0"/>
+        </a:xfrm>
+      </p:grpSpPr>
+      <p:sp>
+        <p:nvSpPr>
+          <p:cNvPr id="2" name="Slide Image Placeholder 1"/>
+          <p:cNvSpPr>
+            <a:spLocks noGrp="1" noRot="1" noChangeAspect="1"/>
+          </p:cNvSpPr>
+          <p:nvPr>
+            <p:ph type="sldImg"/>
+          </p:nvPr>
+        </p:nvSpPr>
+        <p:spPr/>
+      </p:sp>
+      <p:sp>
+        <p:nvSpPr>
+          <p:cNvPr id="3" name="Notes Placeholder 2"/>
+          <p:cNvSpPr>
+            <a:spLocks noGrp="1"/>
+          </p:cNvSpPr>
+          <p:nvPr>
+            <p:ph type="body" idx="1"/>
+          </p:nvPr>
+        </p:nvSpPr>
+        <p:spPr/>
+        <p:txBody>
+          <a:bodyPr/>
+          <a:lstStyle/>
+          <a:p>
+            <a:pPr marL="171450" indent="-171450">
+              <a:buFont typeface="Arial"/>
+              <a:buChar char="•"/>
+            </a:pPr>
+            <a:r>
+              <a:rPr lang="en-US" dirty="0" smtClean="0"/>
+              <a:t>Visual GUI builder</a:t>
+            </a:r>
+          </a:p>
+          <a:p>
+            <a:pPr marL="171450" indent="-171450">
+              <a:buFont typeface="Arial"/>
+              <a:buChar char="•"/>
+            </a:pPr>
+            <a:r>
+              <a:rPr lang="en-US" dirty="0" smtClean="0"/>
+              <a:t>Facilitates layout visually</a:t>
+            </a:r>
+          </a:p>
+          <a:p>
+            <a:pPr marL="171450" indent="-171450">
+              <a:buFont typeface="Arial"/>
+              <a:buChar char="•"/>
+            </a:pPr>
+            <a:r>
+              <a:rPr lang="en-US" dirty="0" smtClean="0"/>
+              <a:t>Outputs XML that is consumed by the application</a:t>
+            </a:r>
+          </a:p>
+          <a:p>
+            <a:endParaRPr lang="en-US" dirty="0"/>
+          </a:p>
+        </p:txBody>
+      </p:sp>
+      <p:sp>
+        <p:nvSpPr>
+          <p:cNvPr id="4" name="Slide Number Placeholder 3"/>
+          <p:cNvSpPr>
+            <a:spLocks noGrp="1"/>
+          </p:cNvSpPr>
+          <p:nvPr>
+            <p:ph type="sldNum" sz="quarter" idx="10"/>
+          </p:nvPr>
+        </p:nvSpPr>
+        <p:spPr/>
+        <p:txBody>
+          <a:bodyPr/>
+          <a:lstStyle/>
+          <a:p>
+            <a:fld id="{343EC50C-9F72-2145-B639-B6AAF286F007}" type="slidenum">
+              <a:rPr lang="en-US" smtClean="0"/>
+              <a:t>7</a:t>
+            </a:fld>
+            <a:endParaRPr lang="en-US"/>
+          </a:p>
+        </p:txBody>
+      </p:sp>
+    </p:spTree>
+    <p:extLst>
+      <p:ext uri="{BB962C8B-B14F-4D97-AF65-F5344CB8AC3E}">
+        <p14:creationId xmlns:p14="http://schemas.microsoft.com/office/powerpoint/2010/main" val="3484450956"/>
+      </p:ext>
+    </p:extLst>
+  </p:cSld>
+  <p:clrMapOvr>
+    <a:masterClrMapping/>
+  </p:clrMapOvr>
+</p:notes>
+</file>
+
+<file path=ppt/notesSlides/notesSlide3.xml><?xml version="1.0" encoding="utf-8"?>
+<p:notes xmlns:a="http://schemas.openxmlformats.org/drawingml/2006/main" xmlns:r="http://schemas.openxmlformats.org/officeDocument/2006/relationships" xmlns:p="http://schemas.openxmlformats.org/presentationml/2006/main">
+  <p:cSld>
+    <p:spTree>
+      <p:nvGrpSpPr>
+        <p:cNvPr id="1" name=""/>
+        <p:cNvGrpSpPr/>
+        <p:nvPr/>
+      </p:nvGrpSpPr>
+      <p:grpSpPr>
+        <a:xfrm>
+          <a:off x="0" y="0"/>
+          <a:ext cx="0" cy="0"/>
+          <a:chOff x="0" y="0"/>
+          <a:chExt cx="0" cy="0"/>
+        </a:xfrm>
+      </p:grpSpPr>
+      <p:sp>
+        <p:nvSpPr>
+          <p:cNvPr id="2" name="Slide Image Placeholder 1"/>
+          <p:cNvSpPr>
+            <a:spLocks noGrp="1" noRot="1" noChangeAspect="1"/>
+          </p:cNvSpPr>
+          <p:nvPr>
+            <p:ph type="sldImg"/>
+          </p:nvPr>
+        </p:nvSpPr>
+        <p:spPr/>
+      </p:sp>
+      <p:sp>
+        <p:nvSpPr>
+          <p:cNvPr id="3" name="Notes Placeholder 2"/>
+          <p:cNvSpPr>
+            <a:spLocks noGrp="1"/>
+          </p:cNvSpPr>
+          <p:nvPr>
+            <p:ph type="body" idx="1"/>
+          </p:nvPr>
+        </p:nvSpPr>
+        <p:spPr/>
+        <p:txBody>
+          <a:bodyPr/>
+          <a:lstStyle/>
+          <a:p>
+            <a:pPr marL="171450" indent="-171450">
+              <a:buFont typeface="Arial"/>
+              <a:buChar char="•"/>
+            </a:pPr>
+            <a:r>
+              <a:rPr lang="en-US" dirty="0" smtClean="0"/>
+              <a:t>Build tool</a:t>
+            </a:r>
+          </a:p>
+          <a:p>
+            <a:pPr marL="171450" indent="-171450">
+              <a:buFont typeface="Arial"/>
+              <a:buChar char="•"/>
+            </a:pPr>
+            <a:r>
+              <a:rPr lang="en-US" dirty="0" smtClean="0"/>
+              <a:t>Dependency management</a:t>
+            </a:r>
+          </a:p>
+          <a:p>
+            <a:pPr marL="171450" indent="-171450">
+              <a:buFont typeface="Arial"/>
+              <a:buChar char="•"/>
+            </a:pPr>
+            <a:r>
+              <a:rPr lang="en-US" dirty="0" smtClean="0"/>
+              <a:t>Task runner</a:t>
+            </a:r>
+          </a:p>
+          <a:p>
+            <a:pPr marL="171450" indent="-171450">
+              <a:buFont typeface="Arial"/>
+              <a:buChar char="•"/>
+            </a:pPr>
+            <a:r>
+              <a:rPr lang="en-US" dirty="0" smtClean="0"/>
+              <a:t>Groovy build scripts</a:t>
+            </a:r>
+          </a:p>
+          <a:p>
+            <a:pPr marL="171450" indent="-171450">
+              <a:buFont typeface="Arial"/>
+              <a:buChar char="•"/>
+            </a:pPr>
+            <a:r>
+              <a:rPr lang="en-US" dirty="0" smtClean="0"/>
+              <a:t>Rich plugin architecture</a:t>
+            </a:r>
+          </a:p>
+          <a:p>
+            <a:endParaRPr lang="en-US" dirty="0"/>
+          </a:p>
+        </p:txBody>
+      </p:sp>
+      <p:sp>
+        <p:nvSpPr>
+          <p:cNvPr id="4" name="Slide Number Placeholder 3"/>
+          <p:cNvSpPr>
+            <a:spLocks noGrp="1"/>
+          </p:cNvSpPr>
+          <p:nvPr>
+            <p:ph type="sldNum" sz="quarter" idx="10"/>
+          </p:nvPr>
+        </p:nvSpPr>
+        <p:spPr/>
+        <p:txBody>
+          <a:bodyPr/>
+          <a:lstStyle/>
+          <a:p>
+            <a:fld id="{343EC50C-9F72-2145-B639-B6AAF286F007}" type="slidenum">
+              <a:rPr lang="en-US" smtClean="0"/>
+              <a:t>9</a:t>
+            </a:fld>
+            <a:endParaRPr lang="en-US"/>
+          </a:p>
+        </p:txBody>
+      </p:sp>
+    </p:spTree>
+    <p:extLst>
+      <p:ext uri="{BB962C8B-B14F-4D97-AF65-F5344CB8AC3E}">
+        <p14:creationId xmlns:p14="http://schemas.microsoft.com/office/powerpoint/2010/main" val="4294615101"/>
+      </p:ext>
+    </p:extLst>
+  </p:cSld>
+  <p:clrMapOvr>
+    <a:masterClrMapping/>
+  </p:clrMapOvr>
+</p:notes>
+</file>
+
+<file path=ppt/notesSlides/notesSlide4.xml><?xml version="1.0" encoding="utf-8"?>
+<p:notes xmlns:a="http://schemas.openxmlformats.org/drawingml/2006/main" xmlns:r="http://schemas.openxmlformats.org/officeDocument/2006/relationships" xmlns:p="http://schemas.openxmlformats.org/presentationml/2006/main">
+  <p:cSld>
+    <p:spTree>
+      <p:nvGrpSpPr>
+        <p:cNvPr id="1" name=""/>
+        <p:cNvGrpSpPr/>
+        <p:nvPr/>
+      </p:nvGrpSpPr>
+      <p:grpSpPr>
+        <a:xfrm>
+          <a:off x="0" y="0"/>
+          <a:ext cx="0" cy="0"/>
+          <a:chOff x="0" y="0"/>
+          <a:chExt cx="0" cy="0"/>
+        </a:xfrm>
+      </p:grpSpPr>
+      <p:sp>
+        <p:nvSpPr>
+          <p:cNvPr id="2" name="Slide Image Placeholder 1"/>
+          <p:cNvSpPr>
+            <a:spLocks noGrp="1" noRot="1" noChangeAspect="1"/>
+          </p:cNvSpPr>
+          <p:nvPr>
+            <p:ph type="sldImg"/>
+          </p:nvPr>
+        </p:nvSpPr>
+        <p:spPr/>
+      </p:sp>
+      <p:sp>
+        <p:nvSpPr>
+          <p:cNvPr id="3" name="Notes Placeholder 2"/>
+          <p:cNvSpPr>
+            <a:spLocks noGrp="1"/>
+          </p:cNvSpPr>
+          <p:nvPr>
+            <p:ph type="body" idx="1"/>
+          </p:nvPr>
+        </p:nvSpPr>
+        <p:spPr/>
+        <p:txBody>
+          <a:bodyPr/>
+          <a:lstStyle/>
+          <a:p>
+            <a:pPr marL="171450" indent="-171450">
+              <a:buFont typeface="Arial"/>
+              <a:buChar char="•"/>
+            </a:pPr>
+            <a:r>
+              <a:rPr lang="en-US" dirty="0" smtClean="0"/>
+              <a:t>On line source repository</a:t>
+            </a:r>
+          </a:p>
+          <a:p>
+            <a:pPr marL="171450" indent="-171450">
+              <a:buFont typeface="Arial"/>
+              <a:buChar char="•"/>
+            </a:pPr>
+            <a:endParaRPr lang="en-US" dirty="0"/>
+          </a:p>
+        </p:txBody>
+      </p:sp>
+      <p:sp>
+        <p:nvSpPr>
+          <p:cNvPr id="4" name="Slide Number Placeholder 3"/>
+          <p:cNvSpPr>
+            <a:spLocks noGrp="1"/>
+          </p:cNvSpPr>
+          <p:nvPr>
+            <p:ph type="sldNum" sz="quarter" idx="10"/>
+          </p:nvPr>
+        </p:nvSpPr>
+        <p:spPr/>
+        <p:txBody>
+          <a:bodyPr/>
+          <a:lstStyle/>
+          <a:p>
+            <a:fld id="{343EC50C-9F72-2145-B639-B6AAF286F007}" type="slidenum">
+              <a:rPr lang="en-US" smtClean="0"/>
+              <a:t>10</a:t>
+            </a:fld>
+            <a:endParaRPr lang="en-US"/>
+          </a:p>
+        </p:txBody>
+      </p:sp>
+    </p:spTree>
+    <p:extLst>
+      <p:ext uri="{BB962C8B-B14F-4D97-AF65-F5344CB8AC3E}">
+        <p14:creationId xmlns:p14="http://schemas.microsoft.com/office/powerpoint/2010/main" val="1065552806"/>
+      </p:ext>
+    </p:extLst>
+  </p:cSld>
+  <p:clrMapOvr>
+    <a:masterClrMapping/>
+  </p:clrMapOvr>
+</p:notes>
+</file>
+
+<file path=ppt/notesSlides/notesSlide5.xml><?xml version="1.0" encoding="utf-8"?>
+<p:notes xmlns:a="http://schemas.openxmlformats.org/drawingml/2006/main" xmlns:r="http://schemas.openxmlformats.org/officeDocument/2006/relationships" xmlns:p="http://schemas.openxmlformats.org/presentationml/2006/main">
+  <p:cSld>
+    <p:spTree>
+      <p:nvGrpSpPr>
+        <p:cNvPr id="1" name=""/>
+        <p:cNvGrpSpPr/>
+        <p:nvPr/>
+      </p:nvGrpSpPr>
+      <p:grpSpPr>
+        <a:xfrm>
+          <a:off x="0" y="0"/>
+          <a:ext cx="0" cy="0"/>
+          <a:chOff x="0" y="0"/>
+          <a:chExt cx="0" cy="0"/>
+        </a:xfrm>
+      </p:grpSpPr>
+      <p:sp>
+        <p:nvSpPr>
+          <p:cNvPr id="2" name="Slide Image Placeholder 1"/>
+          <p:cNvSpPr>
+            <a:spLocks noGrp="1" noRot="1" noChangeAspect="1"/>
+          </p:cNvSpPr>
+          <p:nvPr>
+            <p:ph type="sldImg"/>
+          </p:nvPr>
+        </p:nvSpPr>
+        <p:spPr/>
+      </p:sp>
+      <p:sp>
+        <p:nvSpPr>
+          <p:cNvPr id="3" name="Notes Placeholder 2"/>
+          <p:cNvSpPr>
+            <a:spLocks noGrp="1"/>
+          </p:cNvSpPr>
+          <p:nvPr>
+            <p:ph type="body" idx="1"/>
+          </p:nvPr>
+        </p:nvSpPr>
+        <p:spPr/>
+        <p:txBody>
+          <a:bodyPr/>
+          <a:lstStyle/>
+          <a:p>
+            <a:pPr marL="171450" indent="-171450">
+              <a:buFont typeface="Arial"/>
+              <a:buChar char="•"/>
+            </a:pPr>
+            <a:r>
+              <a:rPr lang="en-US" dirty="0" smtClean="0"/>
+              <a:t>Tool for</a:t>
+            </a:r>
+            <a:r>
+              <a:rPr lang="en-US" baseline="0" dirty="0" smtClean="0"/>
+              <a:t> visual interaction with </a:t>
+            </a:r>
+            <a:r>
+              <a:rPr lang="en-US" baseline="0" dirty="0" err="1" smtClean="0"/>
+              <a:t>git</a:t>
+            </a:r>
+            <a:r>
+              <a:rPr lang="en-US" baseline="0" dirty="0" smtClean="0"/>
+              <a:t> repositories</a:t>
+            </a:r>
+          </a:p>
+          <a:p>
+            <a:pPr marL="171450" indent="-171450">
+              <a:buFont typeface="Arial"/>
+              <a:buChar char="•"/>
+            </a:pPr>
+            <a:r>
+              <a:rPr lang="en-US" baseline="0" dirty="0" smtClean="0"/>
+              <a:t>Provides great tools for:</a:t>
+            </a:r>
+          </a:p>
+          <a:p>
+            <a:pPr marL="628650" lvl="1" indent="-171450">
+              <a:buFont typeface="Arial"/>
+              <a:buChar char="•"/>
+            </a:pPr>
+            <a:r>
+              <a:rPr lang="en-US" baseline="0" dirty="0" smtClean="0"/>
+              <a:t>Looking at history</a:t>
+            </a:r>
+          </a:p>
+          <a:p>
+            <a:pPr marL="628650" lvl="1" indent="-171450">
+              <a:buFont typeface="Arial"/>
+              <a:buChar char="•"/>
+            </a:pPr>
+            <a:r>
+              <a:rPr lang="en-US" baseline="0" dirty="0" smtClean="0"/>
+              <a:t>Branch comparison</a:t>
+            </a:r>
+          </a:p>
+          <a:p>
+            <a:pPr marL="628650" lvl="1" indent="-171450">
+              <a:buFont typeface="Arial"/>
+              <a:buChar char="•"/>
+            </a:pPr>
+            <a:r>
+              <a:rPr lang="en-US" baseline="0" smtClean="0"/>
+              <a:t>File Diffs</a:t>
+            </a:r>
+          </a:p>
+        </p:txBody>
+      </p:sp>
+      <p:sp>
+        <p:nvSpPr>
+          <p:cNvPr id="4" name="Slide Number Placeholder 3"/>
+          <p:cNvSpPr>
+            <a:spLocks noGrp="1"/>
+          </p:cNvSpPr>
+          <p:nvPr>
+            <p:ph type="sldNum" sz="quarter" idx="10"/>
+          </p:nvPr>
+        </p:nvSpPr>
+        <p:spPr/>
+        <p:txBody>
+          <a:bodyPr/>
+          <a:lstStyle/>
+          <a:p>
+            <a:fld id="{343EC50C-9F72-2145-B639-B6AAF286F007}" type="slidenum">
+              <a:rPr lang="en-US" smtClean="0"/>
+              <a:t>11</a:t>
+            </a:fld>
+            <a:endParaRPr lang="en-US"/>
+          </a:p>
+        </p:txBody>
+      </p:sp>
+    </p:spTree>
+    <p:extLst>
+      <p:ext uri="{BB962C8B-B14F-4D97-AF65-F5344CB8AC3E}">
+        <p14:creationId xmlns:p14="http://schemas.microsoft.com/office/powerpoint/2010/main" val="1018624538"/>
+      </p:ext>
+    </p:extLst>
+  </p:cSld>
+  <p:clrMapOvr>
+    <a:masterClrMapping/>
+  </p:clrMapOvr>
+</p:notes>
 </file>
 
 <file path=ppt/slideLayouts/slideLayout1.xml><?xml version="1.0" encoding="utf-8"?>
@@ -228,7 +1268,7 @@
             <a:fld id="{1C295150-4FD7-4802-B0EB-D52217513A72}" type="datetime1">
               <a:rPr lang="en-US" smtClean="0"/>
               <a:pPr/>
-              <a:t>11/12/16</a:t>
+              <a:t>12/3/16</a:t>
             </a:fld>
             <a:endParaRPr lang="en-US" dirty="0"/>
           </a:p>
@@ -755,7 +1795,7 @@
             <a:fld id="{0461895A-832A-4167-BE9B-7448CA062309}" type="datetime1">
               <a:rPr lang="en-US" smtClean="0"/>
               <a:pPr/>
-              <a:t>11/12/16</a:t>
+              <a:t>12/3/16</a:t>
             </a:fld>
             <a:endParaRPr lang="en-US"/>
           </a:p>
@@ -1071,7 +2111,7 @@
             <a:fld id="{227571FF-D602-4BB6-9683-7A1E909D4296}" type="datetime1">
               <a:rPr lang="en-US" smtClean="0"/>
               <a:pPr/>
-              <a:t>11/12/16</a:t>
+              <a:t>12/3/16</a:t>
             </a:fld>
             <a:endParaRPr lang="en-US"/>
           </a:p>
@@ -1359,7 +2399,7 @@
             <a:fld id="{FC392BEB-5202-498C-89F7-BBD3BEE1B887}" type="datetime1">
               <a:rPr lang="en-US" smtClean="0"/>
               <a:pPr/>
-              <a:t>11/12/16</a:t>
+              <a:t>12/3/16</a:t>
             </a:fld>
             <a:endParaRPr lang="en-US"/>
           </a:p>
@@ -1936,7 +2976,7 @@
             <a:fld id="{D242B6C6-10FF-4510-A888-F0B9C6A788B0}" type="datetime1">
               <a:rPr lang="en-US" smtClean="0"/>
               <a:pPr/>
-              <a:t>11/12/16</a:t>
+              <a:t>12/3/16</a:t>
             </a:fld>
             <a:endParaRPr lang="en-US"/>
           </a:p>
@@ -2028,7 +3068,7 @@
             <a:fld id="{C2847B31-A4E1-4FCE-8661-5EC33A675437}" type="datetime1">
               <a:rPr lang="en-US" smtClean="0"/>
               <a:pPr/>
-              <a:t>11/12/16</a:t>
+              <a:t>12/3/16</a:t>
             </a:fld>
             <a:endParaRPr lang="en-US"/>
           </a:p>
@@ -2739,7 +3779,7 @@
             <a:fld id="{7CAD832D-B7F8-4A85-B115-3F84BE9AC26D}" type="datetime1">
               <a:rPr lang="en-US" smtClean="0"/>
               <a:pPr/>
-              <a:t>11/12/16</a:t>
+              <a:t>12/3/16</a:t>
             </a:fld>
             <a:endParaRPr lang="en-US"/>
           </a:p>
@@ -2993,7 +4033,7 @@
             <a:fld id="{E10B34F3-05F7-41C1-B84E-68CE2E00C83C}" type="datetime1">
               <a:rPr lang="en-US" smtClean="0"/>
               <a:pPr/>
-              <a:t>11/12/16</a:t>
+              <a:t>12/3/16</a:t>
             </a:fld>
             <a:endParaRPr lang="en-US"/>
           </a:p>
@@ -3224,7 +4264,7 @@
             <a:fld id="{B8D47F82-2B2E-4837-B3AB-C94C672FBECB}" type="datetime1">
               <a:rPr lang="en-US" smtClean="0"/>
               <a:pPr/>
-              <a:t>11/12/16</a:t>
+              <a:t>12/3/16</a:t>
             </a:fld>
             <a:endParaRPr lang="en-US"/>
           </a:p>
@@ -3500,7 +4540,7 @@
             <a:fld id="{81E57738-F4B0-48EA-9B71-E0F723F8BF6C}" type="datetime1">
               <a:rPr lang="en-US" smtClean="0"/>
               <a:pPr/>
-              <a:t>11/12/16</a:t>
+              <a:t>12/3/16</a:t>
             </a:fld>
             <a:endParaRPr lang="en-US"/>
           </a:p>
@@ -3788,7 +4828,7 @@
             <a:fld id="{E600D5EF-7D26-425F-8C45-B9312ACE18BC}" type="datetime1">
               <a:rPr lang="en-US" smtClean="0"/>
               <a:pPr/>
-              <a:t>11/12/16</a:t>
+              <a:t>12/3/16</a:t>
             </a:fld>
             <a:endParaRPr lang="en-US"/>
           </a:p>
@@ -4058,7 +5098,7 @@
             <a:fld id="{F1909345-DEE0-4B07-8E32-441AC9DA095E}" type="datetime1">
               <a:rPr lang="en-US" smtClean="0"/>
               <a:pPr/>
-              <a:t>11/12/16</a:t>
+              <a:t>12/3/16</a:t>
             </a:fld>
             <a:endParaRPr lang="en-US" dirty="0"/>
           </a:p>
@@ -4603,7 +5643,7 @@
 </p:sld>
 </file>
 
-<file path=ppt/slides/slide2.xml><?xml version="1.0" encoding="utf-8"?>
+<file path=ppt/slides/slide10.xml><?xml version="1.0" encoding="utf-8"?>
 <p:sld xmlns:a="http://schemas.openxmlformats.org/drawingml/2006/main" xmlns:r="http://schemas.openxmlformats.org/officeDocument/2006/relationships" xmlns:p="http://schemas.openxmlformats.org/presentationml/2006/main">
   <p:cSld>
     <p:spTree>
@@ -4636,55 +5676,28 @@
           <a:lstStyle/>
           <a:p>
             <a:r>
-              <a:rPr lang="en-US" dirty="0" smtClean="0"/>
-              <a:t>I am Howard Swope</a:t>
-            </a:r>
-          </a:p>
-          <a:p>
-            <a:r>
-              <a:rPr lang="en-US" dirty="0" smtClean="0"/>
-              <a:t>I chose to do a chat program and called it Chat Noir after the Parisian cabaret</a:t>
-            </a:r>
-          </a:p>
-          <a:p>
-            <a:r>
-              <a:rPr lang="en-US" dirty="0" smtClean="0"/>
-              <a:t>I will discuss the application’s:</a:t>
-            </a:r>
-          </a:p>
-          <a:p>
-            <a:pPr lvl="1"/>
-            <a:r>
-              <a:rPr lang="en-US" dirty="0" smtClean="0"/>
-              <a:t>Architecture</a:t>
-            </a:r>
-          </a:p>
-          <a:p>
-            <a:pPr lvl="1"/>
-            <a:r>
-              <a:rPr lang="en-US" dirty="0" smtClean="0"/>
-              <a:t>Languages</a:t>
-            </a:r>
-          </a:p>
-          <a:p>
-            <a:pPr lvl="1"/>
-            <a:r>
-              <a:rPr lang="en-US" dirty="0" smtClean="0"/>
-              <a:t>Tool set</a:t>
-            </a:r>
-          </a:p>
-          <a:p>
-            <a:pPr lvl="1"/>
-            <a:r>
-              <a:rPr lang="en-US" dirty="0" smtClean="0"/>
-              <a:t>Important software techniques</a:t>
-            </a:r>
-          </a:p>
-          <a:p>
-            <a:pPr lvl="1"/>
-            <a:r>
-              <a:rPr lang="en-US" dirty="0" err="1" smtClean="0"/>
-              <a:t>Featureset</a:t>
+              <a:rPr lang="en-US" dirty="0"/>
+              <a:t>https://</a:t>
+            </a:r>
+            <a:r>
+              <a:rPr lang="en-US" dirty="0" err="1"/>
+              <a:t>github.com</a:t>
+            </a:r>
+            <a:r>
+              <a:rPr lang="en-US" dirty="0"/>
+              <a:t>/</a:t>
+            </a:r>
+            <a:r>
+              <a:rPr lang="en-US" dirty="0" err="1"/>
+              <a:t>hswope</a:t>
+            </a:r>
+            <a:r>
+              <a:rPr lang="en-US" dirty="0"/>
+              <a:t>/</a:t>
+            </a:r>
+            <a:r>
+              <a:rPr lang="en-US" dirty="0" err="1"/>
+              <a:t>chatnoir</a:t>
             </a:r>
             <a:endParaRPr lang="en-US" dirty="0"/>
           </a:p>
@@ -4706,8 +5719,8 @@
           <a:lstStyle/>
           <a:p>
             <a:r>
-              <a:rPr lang="en-US" dirty="0" smtClean="0"/>
-              <a:t>Introduction</a:t>
+              <a:rPr lang="en-US" dirty="0" err="1" smtClean="0"/>
+              <a:t>Github</a:t>
             </a:r>
             <a:endParaRPr lang="en-US" dirty="0"/>
           </a:p>
@@ -4722,15 +5735,15 @@
           <p:nvPr/>
         </p:nvPicPr>
         <p:blipFill>
-          <a:blip r:embed="rId2"/>
+          <a:blip r:embed="rId3"/>
           <a:stretch>
             <a:fillRect/>
           </a:stretch>
         </p:blipFill>
         <p:spPr>
           <a:xfrm>
-            <a:off x="6542047" y="3243417"/>
-            <a:ext cx="2506171" cy="3542814"/>
+            <a:off x="2207260" y="2939338"/>
+            <a:ext cx="4401409" cy="3844323"/>
           </a:xfrm>
           <a:prstGeom prst="rect">
             <a:avLst/>
@@ -4740,7 +5753,7 @@
     </p:spTree>
     <p:extLst>
       <p:ext uri="{BB962C8B-B14F-4D97-AF65-F5344CB8AC3E}">
-        <p14:creationId xmlns:p14="http://schemas.microsoft.com/office/powerpoint/2010/main" val="248103274"/>
+        <p14:creationId xmlns:p14="http://schemas.microsoft.com/office/powerpoint/2010/main" val="1599464905"/>
       </p:ext>
     </p:extLst>
   </p:cSld>
@@ -4750,7 +5763,7 @@
 </p:sld>
 </file>
 
-<file path=ppt/slides/slide3.xml><?xml version="1.0" encoding="utf-8"?>
+<file path=ppt/slides/slide11.xml><?xml version="1.0" encoding="utf-8"?>
 <p:sld xmlns:a="http://schemas.openxmlformats.org/drawingml/2006/main" xmlns:r="http://schemas.openxmlformats.org/officeDocument/2006/relationships" xmlns:p="http://schemas.openxmlformats.org/presentationml/2006/main">
   <p:cSld>
     <p:spTree>
@@ -4767,14 +5780,33 @@
           <a:chExt cx="0" cy="0"/>
         </a:xfrm>
       </p:grpSpPr>
-      <p:sp>
-        <p:nvSpPr>
-          <p:cNvPr id="2" name="Content Placeholder 1"/>
-          <p:cNvSpPr>
-            <a:spLocks noGrp="1"/>
-          </p:cNvSpPr>
+      <p:pic>
+        <p:nvPicPr>
+          <p:cNvPr id="4" name="Content Placeholder 3"/>
+          <p:cNvPicPr>
+            <a:picLocks noGrp="1" noChangeAspect="1"/>
+          </p:cNvPicPr>
           <p:nvPr>
             <p:ph idx="1"/>
+          </p:nvPr>
+        </p:nvPicPr>
+        <p:blipFill>
+          <a:blip r:embed="rId3"/>
+          <a:srcRect t="4494" b="4494"/>
+          <a:stretch>
+            <a:fillRect/>
+          </a:stretch>
+        </p:blipFill>
+        <p:spPr/>
+      </p:pic>
+      <p:sp>
+        <p:nvSpPr>
+          <p:cNvPr id="3" name="Title 2"/>
+          <p:cNvSpPr>
+            <a:spLocks noGrp="1"/>
+          </p:cNvSpPr>
+          <p:nvPr>
+            <p:ph type="title"/>
           </p:nvPr>
         </p:nvSpPr>
         <p:spPr/>
@@ -4783,51 +5815,8 @@
           <a:lstStyle/>
           <a:p>
             <a:r>
-              <a:rPr lang="en-US" dirty="0" smtClean="0"/>
-              <a:t>Systems Architecture – Node Diagram</a:t>
-            </a:r>
-          </a:p>
-          <a:p>
-            <a:r>
-              <a:rPr lang="en-US" dirty="0" smtClean="0"/>
-              <a:t>Software Architecture – Package Diagram</a:t>
-            </a:r>
-          </a:p>
-          <a:p>
-            <a:r>
-              <a:rPr lang="en-US" dirty="0" smtClean="0"/>
-              <a:t>Primary Patterns</a:t>
-            </a:r>
-          </a:p>
-          <a:p>
-            <a:r>
-              <a:rPr lang="en-US" dirty="0" smtClean="0"/>
-              <a:t>Data Model</a:t>
-            </a:r>
-          </a:p>
-          <a:p>
-            <a:endParaRPr lang="en-US" dirty="0"/>
-          </a:p>
-        </p:txBody>
-      </p:sp>
-      <p:sp>
-        <p:nvSpPr>
-          <p:cNvPr id="3" name="Title 2"/>
-          <p:cNvSpPr>
-            <a:spLocks noGrp="1"/>
-          </p:cNvSpPr>
-          <p:nvPr>
-            <p:ph type="title"/>
-          </p:nvPr>
-        </p:nvSpPr>
-        <p:spPr/>
-        <p:txBody>
-          <a:bodyPr/>
-          <a:lstStyle/>
-          <a:p>
-            <a:r>
-              <a:rPr lang="en-US" dirty="0" smtClean="0"/>
-              <a:t>Architecture</a:t>
+              <a:rPr lang="en-US" dirty="0" err="1" smtClean="0"/>
+              <a:t>SmartGit</a:t>
             </a:r>
             <a:endParaRPr lang="en-US" dirty="0"/>
           </a:p>
@@ -4836,7 +5825,7 @@
     </p:spTree>
     <p:extLst>
       <p:ext uri="{BB962C8B-B14F-4D97-AF65-F5344CB8AC3E}">
-        <p14:creationId xmlns:p14="http://schemas.microsoft.com/office/powerpoint/2010/main" val="1691221118"/>
+        <p14:creationId xmlns:p14="http://schemas.microsoft.com/office/powerpoint/2010/main" val="1103348771"/>
       </p:ext>
     </p:extLst>
   </p:cSld>
@@ -4846,7 +5835,7 @@
 </p:sld>
 </file>
 
-<file path=ppt/slides/slide4.xml><?xml version="1.0" encoding="utf-8"?>
+<file path=ppt/slides/slide12.xml><?xml version="1.0" encoding="utf-8"?>
 <p:sld xmlns:a="http://schemas.openxmlformats.org/drawingml/2006/main" xmlns:r="http://schemas.openxmlformats.org/officeDocument/2006/relationships" xmlns:p="http://schemas.openxmlformats.org/presentationml/2006/main">
   <p:cSld>
     <p:spTree>
@@ -4875,218 +5864,8 @@
         </p:nvSpPr>
         <p:spPr/>
         <p:txBody>
-          <a:bodyPr/>
-          <a:lstStyle/>
-          <a:p>
-            <a:r>
-              <a:rPr lang="en-US" dirty="0" err="1" smtClean="0"/>
-              <a:t>Kotlin</a:t>
-            </a:r>
-            <a:r>
-              <a:rPr lang="en-US" dirty="0" smtClean="0"/>
-              <a:t> – client and server</a:t>
-            </a:r>
-          </a:p>
-          <a:p>
-            <a:r>
-              <a:rPr lang="en-US" dirty="0" smtClean="0"/>
-              <a:t>Java – client and server</a:t>
-            </a:r>
-          </a:p>
-          <a:p>
-            <a:r>
-              <a:rPr lang="en-US" dirty="0" smtClean="0"/>
-              <a:t>SQL - database</a:t>
-            </a:r>
-          </a:p>
-          <a:p>
-            <a:r>
-              <a:rPr lang="en-US" dirty="0" smtClean="0"/>
-              <a:t>Groovy – build system</a:t>
-            </a:r>
-          </a:p>
-          <a:p>
-            <a:r>
-              <a:rPr lang="en-US" dirty="0" smtClean="0"/>
-              <a:t>JSON – data serialization</a:t>
-            </a:r>
-          </a:p>
-        </p:txBody>
-      </p:sp>
-      <p:sp>
-        <p:nvSpPr>
-          <p:cNvPr id="3" name="Title 2"/>
-          <p:cNvSpPr>
-            <a:spLocks noGrp="1"/>
-          </p:cNvSpPr>
-          <p:nvPr>
-            <p:ph type="title"/>
-          </p:nvPr>
-        </p:nvSpPr>
-        <p:spPr/>
-        <p:txBody>
-          <a:bodyPr/>
-          <a:lstStyle/>
-          <a:p>
-            <a:r>
-              <a:rPr lang="en-US" dirty="0" smtClean="0"/>
-              <a:t>Languages</a:t>
-            </a:r>
-            <a:endParaRPr lang="en-US" dirty="0"/>
-          </a:p>
-        </p:txBody>
-      </p:sp>
-    </p:spTree>
-    <p:extLst>
-      <p:ext uri="{BB962C8B-B14F-4D97-AF65-F5344CB8AC3E}">
-        <p14:creationId xmlns:p14="http://schemas.microsoft.com/office/powerpoint/2010/main" val="2546911323"/>
-      </p:ext>
-    </p:extLst>
-  </p:cSld>
-  <p:clrMapOvr>
-    <a:masterClrMapping/>
-  </p:clrMapOvr>
-</p:sld>
-</file>
-
-<file path=ppt/slides/slide5.xml><?xml version="1.0" encoding="utf-8"?>
-<p:sld xmlns:a="http://schemas.openxmlformats.org/drawingml/2006/main" xmlns:r="http://schemas.openxmlformats.org/officeDocument/2006/relationships" xmlns:p="http://schemas.openxmlformats.org/presentationml/2006/main">
-  <p:cSld>
-    <p:spTree>
-      <p:nvGrpSpPr>
-        <p:cNvPr id="1" name=""/>
-        <p:cNvGrpSpPr/>
-        <p:nvPr/>
-      </p:nvGrpSpPr>
-      <p:grpSpPr>
-        <a:xfrm>
-          <a:off x="0" y="0"/>
-          <a:ext cx="0" cy="0"/>
-          <a:chOff x="0" y="0"/>
-          <a:chExt cx="0" cy="0"/>
-        </a:xfrm>
-      </p:grpSpPr>
-      <p:sp>
-        <p:nvSpPr>
-          <p:cNvPr id="2" name="Content Placeholder 1"/>
-          <p:cNvSpPr>
-            <a:spLocks noGrp="1"/>
-          </p:cNvSpPr>
-          <p:nvPr>
-            <p:ph idx="1"/>
-          </p:nvPr>
-        </p:nvSpPr>
-        <p:spPr/>
-        <p:txBody>
-          <a:bodyPr/>
-          <a:lstStyle/>
-          <a:p>
-            <a:r>
-              <a:rPr lang="en-US" dirty="0" err="1" smtClean="0"/>
-              <a:t>Intellij</a:t>
-            </a:r>
-            <a:endParaRPr lang="en-US" dirty="0" smtClean="0"/>
-          </a:p>
-          <a:p>
-            <a:r>
-              <a:rPr lang="en-US" dirty="0" err="1" smtClean="0"/>
-              <a:t>Gradle</a:t>
-            </a:r>
-            <a:endParaRPr lang="en-US" dirty="0" smtClean="0"/>
-          </a:p>
-          <a:p>
-            <a:r>
-              <a:rPr lang="en-US" dirty="0" err="1" smtClean="0"/>
-              <a:t>DataGrip</a:t>
-            </a:r>
-            <a:endParaRPr lang="en-US" dirty="0" smtClean="0"/>
-          </a:p>
-          <a:p>
-            <a:r>
-              <a:rPr lang="en-US" dirty="0" err="1" smtClean="0"/>
-              <a:t>Github</a:t>
-            </a:r>
-            <a:endParaRPr lang="en-US" dirty="0" smtClean="0"/>
-          </a:p>
-          <a:p>
-            <a:r>
-              <a:rPr lang="en-US" dirty="0" err="1" smtClean="0"/>
-              <a:t>SmartGit</a:t>
-            </a:r>
-            <a:endParaRPr lang="en-US" dirty="0" smtClean="0"/>
-          </a:p>
-          <a:p>
-            <a:endParaRPr lang="en-US" dirty="0"/>
-          </a:p>
-        </p:txBody>
-      </p:sp>
-      <p:sp>
-        <p:nvSpPr>
-          <p:cNvPr id="3" name="Title 2"/>
-          <p:cNvSpPr>
-            <a:spLocks noGrp="1"/>
-          </p:cNvSpPr>
-          <p:nvPr>
-            <p:ph type="title"/>
-          </p:nvPr>
-        </p:nvSpPr>
-        <p:spPr/>
-        <p:txBody>
-          <a:bodyPr/>
-          <a:lstStyle/>
-          <a:p>
-            <a:r>
-              <a:rPr lang="en-US" dirty="0" smtClean="0"/>
-              <a:t>Tool Set</a:t>
-            </a:r>
-            <a:endParaRPr lang="en-US" dirty="0"/>
-          </a:p>
-        </p:txBody>
-      </p:sp>
-    </p:spTree>
-    <p:extLst>
-      <p:ext uri="{BB962C8B-B14F-4D97-AF65-F5344CB8AC3E}">
-        <p14:creationId xmlns:p14="http://schemas.microsoft.com/office/powerpoint/2010/main" val="680281109"/>
-      </p:ext>
-    </p:extLst>
-  </p:cSld>
-  <p:clrMapOvr>
-    <a:masterClrMapping/>
-  </p:clrMapOvr>
-</p:sld>
-</file>
-
-<file path=ppt/slides/slide6.xml><?xml version="1.0" encoding="utf-8"?>
-<p:sld xmlns:a="http://schemas.openxmlformats.org/drawingml/2006/main" xmlns:r="http://schemas.openxmlformats.org/officeDocument/2006/relationships" xmlns:p="http://schemas.openxmlformats.org/presentationml/2006/main">
-  <p:cSld>
-    <p:spTree>
-      <p:nvGrpSpPr>
-        <p:cNvPr id="1" name=""/>
-        <p:cNvGrpSpPr/>
-        <p:nvPr/>
-      </p:nvGrpSpPr>
-      <p:grpSpPr>
-        <a:xfrm>
-          <a:off x="0" y="0"/>
-          <a:ext cx="0" cy="0"/>
-          <a:chOff x="0" y="0"/>
-          <a:chExt cx="0" cy="0"/>
-        </a:xfrm>
-      </p:grpSpPr>
-      <p:sp>
-        <p:nvSpPr>
-          <p:cNvPr id="2" name="Content Placeholder 1"/>
-          <p:cNvSpPr>
-            <a:spLocks noGrp="1"/>
-          </p:cNvSpPr>
-          <p:nvPr>
-            <p:ph idx="1"/>
-          </p:nvPr>
-        </p:nvSpPr>
-        <p:spPr/>
-        <p:txBody>
           <a:bodyPr>
-            <a:normAutofit lnSpcReduction="10000"/>
+            <a:normAutofit fontScale="92500" lnSpcReduction="10000"/>
           </a:bodyPr>
           <a:lstStyle/>
           <a:p>
@@ -5128,8 +5907,19 @@
           <a:p>
             <a:r>
               <a:rPr lang="en-US" dirty="0" smtClean="0"/>
-              <a:t>Rest Support</a:t>
-            </a:r>
+              <a:t>Rest </a:t>
+            </a:r>
+            <a:r>
+              <a:rPr lang="en-US" dirty="0" smtClean="0"/>
+              <a:t>Support</a:t>
+            </a:r>
+          </a:p>
+          <a:p>
+            <a:r>
+              <a:rPr lang="en-US" dirty="0" smtClean="0"/>
+              <a:t>Database Support</a:t>
+            </a:r>
+            <a:endParaRPr lang="en-US" dirty="0" smtClean="0"/>
           </a:p>
           <a:p>
             <a:r>
@@ -5184,7 +5974,7 @@
 </p:sld>
 </file>
 
-<file path=ppt/slides/slide7.xml><?xml version="1.0" encoding="utf-8"?>
+<file path=ppt/slides/slide13.xml><?xml version="1.0" encoding="utf-8"?>
 <p:sld xmlns:a="http://schemas.openxmlformats.org/drawingml/2006/main" xmlns:r="http://schemas.openxmlformats.org/officeDocument/2006/relationships" xmlns:p="http://schemas.openxmlformats.org/presentationml/2006/main">
   <p:cSld>
     <p:spTree>
@@ -5263,7 +6053,7 @@
 </p:sld>
 </file>
 
-<file path=ppt/slides/slide8.xml><?xml version="1.0" encoding="utf-8"?>
+<file path=ppt/slides/slide14.xml><?xml version="1.0" encoding="utf-8"?>
 <p:sld xmlns:a="http://schemas.openxmlformats.org/drawingml/2006/main" xmlns:r="http://schemas.openxmlformats.org/officeDocument/2006/relationships" xmlns:p="http://schemas.openxmlformats.org/presentationml/2006/main">
   <p:cSld>
     <p:spTree>
@@ -5563,6 +6353,779 @@
       </p:par>
     </p:tnLst>
   </p:timing>
+</p:sld>
+</file>
+
+<file path=ppt/slides/slide2.xml><?xml version="1.0" encoding="utf-8"?>
+<p:sld xmlns:a="http://schemas.openxmlformats.org/drawingml/2006/main" xmlns:r="http://schemas.openxmlformats.org/officeDocument/2006/relationships" xmlns:p="http://schemas.openxmlformats.org/presentationml/2006/main">
+  <p:cSld>
+    <p:spTree>
+      <p:nvGrpSpPr>
+        <p:cNvPr id="1" name=""/>
+        <p:cNvGrpSpPr/>
+        <p:nvPr/>
+      </p:nvGrpSpPr>
+      <p:grpSpPr>
+        <a:xfrm>
+          <a:off x="0" y="0"/>
+          <a:ext cx="0" cy="0"/>
+          <a:chOff x="0" y="0"/>
+          <a:chExt cx="0" cy="0"/>
+        </a:xfrm>
+      </p:grpSpPr>
+      <p:sp>
+        <p:nvSpPr>
+          <p:cNvPr id="2" name="Content Placeholder 1"/>
+          <p:cNvSpPr>
+            <a:spLocks noGrp="1"/>
+          </p:cNvSpPr>
+          <p:nvPr>
+            <p:ph idx="1"/>
+          </p:nvPr>
+        </p:nvSpPr>
+        <p:spPr/>
+        <p:txBody>
+          <a:bodyPr/>
+          <a:lstStyle/>
+          <a:p>
+            <a:r>
+              <a:rPr lang="en-US" dirty="0" smtClean="0"/>
+              <a:t>I am Howard Swope</a:t>
+            </a:r>
+          </a:p>
+          <a:p>
+            <a:r>
+              <a:rPr lang="en-US" dirty="0" smtClean="0"/>
+              <a:t>I chose to do a chat program and called it Chat Noir after the Parisian cabaret</a:t>
+            </a:r>
+          </a:p>
+          <a:p>
+            <a:r>
+              <a:rPr lang="en-US" dirty="0" smtClean="0"/>
+              <a:t>I will discuss the application’s:</a:t>
+            </a:r>
+          </a:p>
+          <a:p>
+            <a:pPr lvl="1"/>
+            <a:r>
+              <a:rPr lang="en-US" dirty="0" smtClean="0"/>
+              <a:t>Architecture</a:t>
+            </a:r>
+          </a:p>
+          <a:p>
+            <a:pPr lvl="1"/>
+            <a:r>
+              <a:rPr lang="en-US" dirty="0" smtClean="0"/>
+              <a:t>Languages</a:t>
+            </a:r>
+          </a:p>
+          <a:p>
+            <a:pPr lvl="1"/>
+            <a:r>
+              <a:rPr lang="en-US" dirty="0" smtClean="0"/>
+              <a:t>Tool set</a:t>
+            </a:r>
+          </a:p>
+          <a:p>
+            <a:pPr lvl="1"/>
+            <a:r>
+              <a:rPr lang="en-US" dirty="0" smtClean="0"/>
+              <a:t>Important software techniques</a:t>
+            </a:r>
+          </a:p>
+          <a:p>
+            <a:pPr lvl="1"/>
+            <a:r>
+              <a:rPr lang="en-US" dirty="0" err="1" smtClean="0"/>
+              <a:t>Featureset</a:t>
+            </a:r>
+            <a:endParaRPr lang="en-US" dirty="0"/>
+          </a:p>
+        </p:txBody>
+      </p:sp>
+      <p:sp>
+        <p:nvSpPr>
+          <p:cNvPr id="3" name="Title 2"/>
+          <p:cNvSpPr>
+            <a:spLocks noGrp="1"/>
+          </p:cNvSpPr>
+          <p:nvPr>
+            <p:ph type="title"/>
+          </p:nvPr>
+        </p:nvSpPr>
+        <p:spPr/>
+        <p:txBody>
+          <a:bodyPr/>
+          <a:lstStyle/>
+          <a:p>
+            <a:r>
+              <a:rPr lang="en-US" dirty="0" smtClean="0"/>
+              <a:t>Introduction</a:t>
+            </a:r>
+            <a:endParaRPr lang="en-US" dirty="0"/>
+          </a:p>
+        </p:txBody>
+      </p:sp>
+      <p:pic>
+        <p:nvPicPr>
+          <p:cNvPr id="4" name="Picture 3"/>
+          <p:cNvPicPr>
+            <a:picLocks noChangeAspect="1"/>
+          </p:cNvPicPr>
+          <p:nvPr/>
+        </p:nvPicPr>
+        <p:blipFill>
+          <a:blip r:embed="rId2"/>
+          <a:stretch>
+            <a:fillRect/>
+          </a:stretch>
+        </p:blipFill>
+        <p:spPr>
+          <a:xfrm>
+            <a:off x="6542047" y="3243417"/>
+            <a:ext cx="2506171" cy="3542814"/>
+          </a:xfrm>
+          <a:prstGeom prst="rect">
+            <a:avLst/>
+          </a:prstGeom>
+        </p:spPr>
+      </p:pic>
+    </p:spTree>
+    <p:extLst>
+      <p:ext uri="{BB962C8B-B14F-4D97-AF65-F5344CB8AC3E}">
+        <p14:creationId xmlns:p14="http://schemas.microsoft.com/office/powerpoint/2010/main" val="248103274"/>
+      </p:ext>
+    </p:extLst>
+  </p:cSld>
+  <p:clrMapOvr>
+    <a:masterClrMapping/>
+  </p:clrMapOvr>
+</p:sld>
+</file>
+
+<file path=ppt/slides/slide3.xml><?xml version="1.0" encoding="utf-8"?>
+<p:sld xmlns:a="http://schemas.openxmlformats.org/drawingml/2006/main" xmlns:r="http://schemas.openxmlformats.org/officeDocument/2006/relationships" xmlns:p="http://schemas.openxmlformats.org/presentationml/2006/main">
+  <p:cSld>
+    <p:spTree>
+      <p:nvGrpSpPr>
+        <p:cNvPr id="1" name=""/>
+        <p:cNvGrpSpPr/>
+        <p:nvPr/>
+      </p:nvGrpSpPr>
+      <p:grpSpPr>
+        <a:xfrm>
+          <a:off x="0" y="0"/>
+          <a:ext cx="0" cy="0"/>
+          <a:chOff x="0" y="0"/>
+          <a:chExt cx="0" cy="0"/>
+        </a:xfrm>
+      </p:grpSpPr>
+      <p:sp>
+        <p:nvSpPr>
+          <p:cNvPr id="2" name="Content Placeholder 1"/>
+          <p:cNvSpPr>
+            <a:spLocks noGrp="1"/>
+          </p:cNvSpPr>
+          <p:nvPr>
+            <p:ph idx="1"/>
+          </p:nvPr>
+        </p:nvSpPr>
+        <p:spPr/>
+        <p:txBody>
+          <a:bodyPr/>
+          <a:lstStyle/>
+          <a:p>
+            <a:r>
+              <a:rPr lang="en-US" dirty="0" smtClean="0"/>
+              <a:t>Systems Architecture – Node Diagram</a:t>
+            </a:r>
+          </a:p>
+          <a:p>
+            <a:r>
+              <a:rPr lang="en-US" dirty="0" smtClean="0"/>
+              <a:t>Software Architecture – Package Diagram</a:t>
+            </a:r>
+          </a:p>
+          <a:p>
+            <a:r>
+              <a:rPr lang="en-US" dirty="0" smtClean="0"/>
+              <a:t>Primary Patterns</a:t>
+            </a:r>
+          </a:p>
+          <a:p>
+            <a:r>
+              <a:rPr lang="en-US" dirty="0" smtClean="0"/>
+              <a:t>Data Model</a:t>
+            </a:r>
+          </a:p>
+          <a:p>
+            <a:endParaRPr lang="en-US" dirty="0"/>
+          </a:p>
+        </p:txBody>
+      </p:sp>
+      <p:sp>
+        <p:nvSpPr>
+          <p:cNvPr id="3" name="Title 2"/>
+          <p:cNvSpPr>
+            <a:spLocks noGrp="1"/>
+          </p:cNvSpPr>
+          <p:nvPr>
+            <p:ph type="title"/>
+          </p:nvPr>
+        </p:nvSpPr>
+        <p:spPr/>
+        <p:txBody>
+          <a:bodyPr/>
+          <a:lstStyle/>
+          <a:p>
+            <a:r>
+              <a:rPr lang="en-US" dirty="0" smtClean="0"/>
+              <a:t>Architecture</a:t>
+            </a:r>
+            <a:endParaRPr lang="en-US" dirty="0"/>
+          </a:p>
+        </p:txBody>
+      </p:sp>
+    </p:spTree>
+    <p:extLst>
+      <p:ext uri="{BB962C8B-B14F-4D97-AF65-F5344CB8AC3E}">
+        <p14:creationId xmlns:p14="http://schemas.microsoft.com/office/powerpoint/2010/main" val="1691221118"/>
+      </p:ext>
+    </p:extLst>
+  </p:cSld>
+  <p:clrMapOvr>
+    <a:masterClrMapping/>
+  </p:clrMapOvr>
+</p:sld>
+</file>
+
+<file path=ppt/slides/slide4.xml><?xml version="1.0" encoding="utf-8"?>
+<p:sld xmlns:a="http://schemas.openxmlformats.org/drawingml/2006/main" xmlns:r="http://schemas.openxmlformats.org/officeDocument/2006/relationships" xmlns:p="http://schemas.openxmlformats.org/presentationml/2006/main">
+  <p:cSld>
+    <p:spTree>
+      <p:nvGrpSpPr>
+        <p:cNvPr id="1" name=""/>
+        <p:cNvGrpSpPr/>
+        <p:nvPr/>
+      </p:nvGrpSpPr>
+      <p:grpSpPr>
+        <a:xfrm>
+          <a:off x="0" y="0"/>
+          <a:ext cx="0" cy="0"/>
+          <a:chOff x="0" y="0"/>
+          <a:chExt cx="0" cy="0"/>
+        </a:xfrm>
+      </p:grpSpPr>
+      <p:sp>
+        <p:nvSpPr>
+          <p:cNvPr id="2" name="Content Placeholder 1"/>
+          <p:cNvSpPr>
+            <a:spLocks noGrp="1"/>
+          </p:cNvSpPr>
+          <p:nvPr>
+            <p:ph idx="1"/>
+          </p:nvPr>
+        </p:nvSpPr>
+        <p:spPr/>
+        <p:txBody>
+          <a:bodyPr/>
+          <a:lstStyle/>
+          <a:p>
+            <a:r>
+              <a:rPr lang="en-US" dirty="0" err="1" smtClean="0"/>
+              <a:t>Kotlin</a:t>
+            </a:r>
+            <a:r>
+              <a:rPr lang="en-US" dirty="0" smtClean="0"/>
+              <a:t> – client and server</a:t>
+            </a:r>
+          </a:p>
+          <a:p>
+            <a:r>
+              <a:rPr lang="en-US" dirty="0" smtClean="0"/>
+              <a:t>Java – client and server</a:t>
+            </a:r>
+          </a:p>
+          <a:p>
+            <a:r>
+              <a:rPr lang="en-US" dirty="0" smtClean="0"/>
+              <a:t>SQL - database</a:t>
+            </a:r>
+          </a:p>
+          <a:p>
+            <a:r>
+              <a:rPr lang="en-US" dirty="0" smtClean="0"/>
+              <a:t>Groovy – build system</a:t>
+            </a:r>
+          </a:p>
+          <a:p>
+            <a:r>
+              <a:rPr lang="en-US" dirty="0" smtClean="0"/>
+              <a:t>JSON – data serialization</a:t>
+            </a:r>
+          </a:p>
+        </p:txBody>
+      </p:sp>
+      <p:sp>
+        <p:nvSpPr>
+          <p:cNvPr id="3" name="Title 2"/>
+          <p:cNvSpPr>
+            <a:spLocks noGrp="1"/>
+          </p:cNvSpPr>
+          <p:nvPr>
+            <p:ph type="title"/>
+          </p:nvPr>
+        </p:nvSpPr>
+        <p:spPr/>
+        <p:txBody>
+          <a:bodyPr/>
+          <a:lstStyle/>
+          <a:p>
+            <a:r>
+              <a:rPr lang="en-US" dirty="0" smtClean="0"/>
+              <a:t>Languages</a:t>
+            </a:r>
+            <a:endParaRPr lang="en-US" dirty="0"/>
+          </a:p>
+        </p:txBody>
+      </p:sp>
+    </p:spTree>
+    <p:extLst>
+      <p:ext uri="{BB962C8B-B14F-4D97-AF65-F5344CB8AC3E}">
+        <p14:creationId xmlns:p14="http://schemas.microsoft.com/office/powerpoint/2010/main" val="2546911323"/>
+      </p:ext>
+    </p:extLst>
+  </p:cSld>
+  <p:clrMapOvr>
+    <a:masterClrMapping/>
+  </p:clrMapOvr>
+</p:sld>
+</file>
+
+<file path=ppt/slides/slide5.xml><?xml version="1.0" encoding="utf-8"?>
+<p:sld xmlns:a="http://schemas.openxmlformats.org/drawingml/2006/main" xmlns:r="http://schemas.openxmlformats.org/officeDocument/2006/relationships" xmlns:p="http://schemas.openxmlformats.org/presentationml/2006/main">
+  <p:cSld>
+    <p:spTree>
+      <p:nvGrpSpPr>
+        <p:cNvPr id="1" name=""/>
+        <p:cNvGrpSpPr/>
+        <p:nvPr/>
+      </p:nvGrpSpPr>
+      <p:grpSpPr>
+        <a:xfrm>
+          <a:off x="0" y="0"/>
+          <a:ext cx="0" cy="0"/>
+          <a:chOff x="0" y="0"/>
+          <a:chExt cx="0" cy="0"/>
+        </a:xfrm>
+      </p:grpSpPr>
+      <p:sp>
+        <p:nvSpPr>
+          <p:cNvPr id="2" name="Content Placeholder 1"/>
+          <p:cNvSpPr>
+            <a:spLocks noGrp="1"/>
+          </p:cNvSpPr>
+          <p:nvPr>
+            <p:ph idx="1"/>
+          </p:nvPr>
+        </p:nvSpPr>
+        <p:spPr/>
+        <p:txBody>
+          <a:bodyPr/>
+          <a:lstStyle/>
+          <a:p>
+            <a:r>
+              <a:rPr lang="en-US" dirty="0" err="1" smtClean="0"/>
+              <a:t>Intellij</a:t>
+            </a:r>
+            <a:endParaRPr lang="en-US" dirty="0" smtClean="0"/>
+          </a:p>
+          <a:p>
+            <a:r>
+              <a:rPr lang="en-US" dirty="0" err="1" smtClean="0"/>
+              <a:t>JavaFX</a:t>
+            </a:r>
+            <a:r>
+              <a:rPr lang="en-US" dirty="0" smtClean="0"/>
+              <a:t> Scene Builder</a:t>
+            </a:r>
+            <a:endParaRPr lang="en-US" dirty="0" smtClean="0"/>
+          </a:p>
+          <a:p>
+            <a:r>
+              <a:rPr lang="en-US" dirty="0" err="1" smtClean="0"/>
+              <a:t>Gradle</a:t>
+            </a:r>
+            <a:endParaRPr lang="en-US" dirty="0" smtClean="0"/>
+          </a:p>
+          <a:p>
+            <a:r>
+              <a:rPr lang="en-US" dirty="0" err="1" smtClean="0"/>
+              <a:t>Github</a:t>
+            </a:r>
+            <a:endParaRPr lang="en-US" dirty="0" smtClean="0"/>
+          </a:p>
+          <a:p>
+            <a:r>
+              <a:rPr lang="en-US" dirty="0" err="1" smtClean="0"/>
+              <a:t>SmartGit</a:t>
+            </a:r>
+            <a:endParaRPr lang="en-US" dirty="0" smtClean="0"/>
+          </a:p>
+          <a:p>
+            <a:endParaRPr lang="en-US" dirty="0"/>
+          </a:p>
+        </p:txBody>
+      </p:sp>
+      <p:sp>
+        <p:nvSpPr>
+          <p:cNvPr id="3" name="Title 2"/>
+          <p:cNvSpPr>
+            <a:spLocks noGrp="1"/>
+          </p:cNvSpPr>
+          <p:nvPr>
+            <p:ph type="title"/>
+          </p:nvPr>
+        </p:nvSpPr>
+        <p:spPr/>
+        <p:txBody>
+          <a:bodyPr/>
+          <a:lstStyle/>
+          <a:p>
+            <a:r>
+              <a:rPr lang="en-US" dirty="0" smtClean="0"/>
+              <a:t>Tool Set</a:t>
+            </a:r>
+            <a:endParaRPr lang="en-US" dirty="0"/>
+          </a:p>
+        </p:txBody>
+      </p:sp>
+    </p:spTree>
+    <p:extLst>
+      <p:ext uri="{BB962C8B-B14F-4D97-AF65-F5344CB8AC3E}">
+        <p14:creationId xmlns:p14="http://schemas.microsoft.com/office/powerpoint/2010/main" val="680281109"/>
+      </p:ext>
+    </p:extLst>
+  </p:cSld>
+  <p:clrMapOvr>
+    <a:masterClrMapping/>
+  </p:clrMapOvr>
+</p:sld>
+</file>
+
+<file path=ppt/slides/slide6.xml><?xml version="1.0" encoding="utf-8"?>
+<p:sld xmlns:a="http://schemas.openxmlformats.org/drawingml/2006/main" xmlns:r="http://schemas.openxmlformats.org/officeDocument/2006/relationships" xmlns:p="http://schemas.openxmlformats.org/presentationml/2006/main">
+  <p:cSld>
+    <p:spTree>
+      <p:nvGrpSpPr>
+        <p:cNvPr id="1" name=""/>
+        <p:cNvGrpSpPr/>
+        <p:nvPr/>
+      </p:nvGrpSpPr>
+      <p:grpSpPr>
+        <a:xfrm>
+          <a:off x="0" y="0"/>
+          <a:ext cx="0" cy="0"/>
+          <a:chOff x="0" y="0"/>
+          <a:chExt cx="0" cy="0"/>
+        </a:xfrm>
+      </p:grpSpPr>
+      <p:sp>
+        <p:nvSpPr>
+          <p:cNvPr id="3" name="Title 2"/>
+          <p:cNvSpPr>
+            <a:spLocks noGrp="1"/>
+          </p:cNvSpPr>
+          <p:nvPr>
+            <p:ph type="title"/>
+          </p:nvPr>
+        </p:nvSpPr>
+        <p:spPr/>
+        <p:txBody>
+          <a:bodyPr/>
+          <a:lstStyle/>
+          <a:p>
+            <a:r>
+              <a:rPr lang="en-US" dirty="0" err="1" smtClean="0"/>
+              <a:t>IntelliJ</a:t>
+            </a:r>
+            <a:endParaRPr lang="en-US" dirty="0"/>
+          </a:p>
+        </p:txBody>
+      </p:sp>
+      <p:pic>
+        <p:nvPicPr>
+          <p:cNvPr id="4" name="Picture 3"/>
+          <p:cNvPicPr>
+            <a:picLocks noChangeAspect="1"/>
+          </p:cNvPicPr>
+          <p:nvPr/>
+        </p:nvPicPr>
+        <p:blipFill>
+          <a:blip r:embed="rId3"/>
+          <a:stretch>
+            <a:fillRect/>
+          </a:stretch>
+        </p:blipFill>
+        <p:spPr>
+          <a:xfrm>
+            <a:off x="788998" y="2415864"/>
+            <a:ext cx="7572411" cy="4152995"/>
+          </a:xfrm>
+          <a:prstGeom prst="rect">
+            <a:avLst/>
+          </a:prstGeom>
+        </p:spPr>
+      </p:pic>
+    </p:spTree>
+    <p:extLst>
+      <p:ext uri="{BB962C8B-B14F-4D97-AF65-F5344CB8AC3E}">
+        <p14:creationId xmlns:p14="http://schemas.microsoft.com/office/powerpoint/2010/main" val="1427179181"/>
+      </p:ext>
+    </p:extLst>
+  </p:cSld>
+  <p:clrMapOvr>
+    <a:masterClrMapping/>
+  </p:clrMapOvr>
+</p:sld>
+</file>
+
+<file path=ppt/slides/slide7.xml><?xml version="1.0" encoding="utf-8"?>
+<p:sld xmlns:a="http://schemas.openxmlformats.org/drawingml/2006/main" xmlns:r="http://schemas.openxmlformats.org/officeDocument/2006/relationships" xmlns:p="http://schemas.openxmlformats.org/presentationml/2006/main">
+  <p:cSld>
+    <p:spTree>
+      <p:nvGrpSpPr>
+        <p:cNvPr id="1" name=""/>
+        <p:cNvGrpSpPr/>
+        <p:nvPr/>
+      </p:nvGrpSpPr>
+      <p:grpSpPr>
+        <a:xfrm>
+          <a:off x="0" y="0"/>
+          <a:ext cx="0" cy="0"/>
+          <a:chOff x="0" y="0"/>
+          <a:chExt cx="0" cy="0"/>
+        </a:xfrm>
+      </p:grpSpPr>
+      <p:sp>
+        <p:nvSpPr>
+          <p:cNvPr id="3" name="Title 2"/>
+          <p:cNvSpPr>
+            <a:spLocks noGrp="1"/>
+          </p:cNvSpPr>
+          <p:nvPr>
+            <p:ph type="title"/>
+          </p:nvPr>
+        </p:nvSpPr>
+        <p:spPr/>
+        <p:txBody>
+          <a:bodyPr/>
+          <a:lstStyle/>
+          <a:p>
+            <a:r>
+              <a:rPr lang="en-US" dirty="0" err="1" smtClean="0"/>
+              <a:t>JavaFX</a:t>
+            </a:r>
+            <a:r>
+              <a:rPr lang="en-US" dirty="0" smtClean="0"/>
+              <a:t> Scene Builder</a:t>
+            </a:r>
+            <a:endParaRPr lang="en-US" dirty="0"/>
+          </a:p>
+        </p:txBody>
+      </p:sp>
+      <p:pic>
+        <p:nvPicPr>
+          <p:cNvPr id="6" name="Picture 5"/>
+          <p:cNvPicPr>
+            <a:picLocks noChangeAspect="1"/>
+          </p:cNvPicPr>
+          <p:nvPr/>
+        </p:nvPicPr>
+        <p:blipFill>
+          <a:blip r:embed="rId3"/>
+          <a:stretch>
+            <a:fillRect/>
+          </a:stretch>
+        </p:blipFill>
+        <p:spPr>
+          <a:xfrm>
+            <a:off x="1215240" y="2257226"/>
+            <a:ext cx="6713519" cy="4331303"/>
+          </a:xfrm>
+          <a:prstGeom prst="rect">
+            <a:avLst/>
+          </a:prstGeom>
+        </p:spPr>
+      </p:pic>
+    </p:spTree>
+    <p:extLst>
+      <p:ext uri="{BB962C8B-B14F-4D97-AF65-F5344CB8AC3E}">
+        <p14:creationId xmlns:p14="http://schemas.microsoft.com/office/powerpoint/2010/main" val="2125045359"/>
+      </p:ext>
+    </p:extLst>
+  </p:cSld>
+  <p:clrMapOvr>
+    <a:masterClrMapping/>
+  </p:clrMapOvr>
+</p:sld>
+</file>
+
+<file path=ppt/slides/slide8.xml><?xml version="1.0" encoding="utf-8"?>
+<p:sld xmlns:a="http://schemas.openxmlformats.org/drawingml/2006/main" xmlns:r="http://schemas.openxmlformats.org/officeDocument/2006/relationships" xmlns:p="http://schemas.openxmlformats.org/presentationml/2006/main">
+  <p:cSld>
+    <p:spTree>
+      <p:nvGrpSpPr>
+        <p:cNvPr id="1" name=""/>
+        <p:cNvGrpSpPr/>
+        <p:nvPr/>
+      </p:nvGrpSpPr>
+      <p:grpSpPr>
+        <a:xfrm>
+          <a:off x="0" y="0"/>
+          <a:ext cx="0" cy="0"/>
+          <a:chOff x="0" y="0"/>
+          <a:chExt cx="0" cy="0"/>
+        </a:xfrm>
+      </p:grpSpPr>
+      <p:sp>
+        <p:nvSpPr>
+          <p:cNvPr id="3" name="Title 2"/>
+          <p:cNvSpPr>
+            <a:spLocks noGrp="1"/>
+          </p:cNvSpPr>
+          <p:nvPr>
+            <p:ph type="title"/>
+          </p:nvPr>
+        </p:nvSpPr>
+        <p:spPr/>
+        <p:txBody>
+          <a:bodyPr/>
+          <a:lstStyle/>
+          <a:p>
+            <a:r>
+              <a:rPr lang="en-US" dirty="0" err="1" smtClean="0"/>
+              <a:t>JavaFX</a:t>
+            </a:r>
+            <a:r>
+              <a:rPr lang="en-US" dirty="0" smtClean="0"/>
+              <a:t> Scene Builder</a:t>
+            </a:r>
+            <a:endParaRPr lang="en-US" dirty="0"/>
+          </a:p>
+        </p:txBody>
+      </p:sp>
+      <p:pic>
+        <p:nvPicPr>
+          <p:cNvPr id="4" name="Picture 3"/>
+          <p:cNvPicPr>
+            <a:picLocks noChangeAspect="1"/>
+          </p:cNvPicPr>
+          <p:nvPr/>
+        </p:nvPicPr>
+        <p:blipFill>
+          <a:blip r:embed="rId2"/>
+          <a:stretch>
+            <a:fillRect/>
+          </a:stretch>
+        </p:blipFill>
+        <p:spPr>
+          <a:xfrm>
+            <a:off x="1955350" y="2215127"/>
+            <a:ext cx="5217311" cy="4464068"/>
+          </a:xfrm>
+          <a:prstGeom prst="rect">
+            <a:avLst/>
+          </a:prstGeom>
+        </p:spPr>
+      </p:pic>
+    </p:spTree>
+    <p:extLst>
+      <p:ext uri="{BB962C8B-B14F-4D97-AF65-F5344CB8AC3E}">
+        <p14:creationId xmlns:p14="http://schemas.microsoft.com/office/powerpoint/2010/main" val="3403695162"/>
+      </p:ext>
+    </p:extLst>
+  </p:cSld>
+  <p:clrMapOvr>
+    <a:masterClrMapping/>
+  </p:clrMapOvr>
+</p:sld>
+</file>
+
+<file path=ppt/slides/slide9.xml><?xml version="1.0" encoding="utf-8"?>
+<p:sld xmlns:a="http://schemas.openxmlformats.org/drawingml/2006/main" xmlns:r="http://schemas.openxmlformats.org/officeDocument/2006/relationships" xmlns:p="http://schemas.openxmlformats.org/presentationml/2006/main">
+  <p:cSld>
+    <p:spTree>
+      <p:nvGrpSpPr>
+        <p:cNvPr id="1" name=""/>
+        <p:cNvGrpSpPr/>
+        <p:nvPr/>
+      </p:nvGrpSpPr>
+      <p:grpSpPr>
+        <a:xfrm>
+          <a:off x="0" y="0"/>
+          <a:ext cx="0" cy="0"/>
+          <a:chOff x="0" y="0"/>
+          <a:chExt cx="0" cy="0"/>
+        </a:xfrm>
+      </p:grpSpPr>
+      <p:sp>
+        <p:nvSpPr>
+          <p:cNvPr id="3" name="Title 2"/>
+          <p:cNvSpPr>
+            <a:spLocks noGrp="1"/>
+          </p:cNvSpPr>
+          <p:nvPr>
+            <p:ph type="title"/>
+          </p:nvPr>
+        </p:nvSpPr>
+        <p:spPr/>
+        <p:txBody>
+          <a:bodyPr/>
+          <a:lstStyle/>
+          <a:p>
+            <a:r>
+              <a:rPr lang="en-US" dirty="0" err="1" smtClean="0"/>
+              <a:t>Gradle</a:t>
+            </a:r>
+            <a:endParaRPr lang="en-US" dirty="0"/>
+          </a:p>
+        </p:txBody>
+      </p:sp>
+      <p:pic>
+        <p:nvPicPr>
+          <p:cNvPr id="5" name="Content Placeholder 4"/>
+          <p:cNvPicPr>
+            <a:picLocks noGrp="1" noChangeAspect="1"/>
+          </p:cNvPicPr>
+          <p:nvPr>
+            <p:ph idx="1"/>
+          </p:nvPr>
+        </p:nvPicPr>
+        <p:blipFill>
+          <a:blip r:embed="rId3"/>
+          <a:srcRect t="22911" b="22911"/>
+          <a:stretch>
+            <a:fillRect/>
+          </a:stretch>
+        </p:blipFill>
+        <p:spPr>
+          <a:xfrm>
+            <a:off x="779878" y="2560819"/>
+            <a:ext cx="7745505" cy="3877815"/>
+          </a:xfrm>
+        </p:spPr>
+      </p:pic>
+    </p:spTree>
+    <p:extLst>
+      <p:ext uri="{BB962C8B-B14F-4D97-AF65-F5344CB8AC3E}">
+        <p14:creationId xmlns:p14="http://schemas.microsoft.com/office/powerpoint/2010/main" val="4188043223"/>
+      </p:ext>
+    </p:extLst>
+  </p:cSld>
+  <p:clrMapOvr>
+    <a:masterClrMapping/>
+  </p:clrMapOvr>
 </p:sld>
 </file>
 
@@ -5828,4 +7391,324 @@
   <a:objectDefaults/>
   <a:extraClrSchemeLst/>
 </a:theme>
+</file>
+
+<file path=ppt/theme/theme2.xml><?xml version="1.0" encoding="utf-8"?>
+<a:theme xmlns:a="http://schemas.openxmlformats.org/drawingml/2006/main" name="Office Theme">
+  <a:themeElements>
+    <a:clrScheme name="Office">
+      <a:dk1>
+        <a:sysClr val="windowText" lastClr="000000"/>
+      </a:dk1>
+      <a:lt1>
+        <a:sysClr val="window" lastClr="FFFFFF"/>
+      </a:lt1>
+      <a:dk2>
+        <a:srgbClr val="1F497D"/>
+      </a:dk2>
+      <a:lt2>
+        <a:srgbClr val="EEECE1"/>
+      </a:lt2>
+      <a:accent1>
+        <a:srgbClr val="4F81BD"/>
+      </a:accent1>
+      <a:accent2>
+        <a:srgbClr val="C0504D"/>
+      </a:accent2>
+      <a:accent3>
+        <a:srgbClr val="9BBB59"/>
+      </a:accent3>
+      <a:accent4>
+        <a:srgbClr val="8064A2"/>
+      </a:accent4>
+      <a:accent5>
+        <a:srgbClr val="4BACC6"/>
+      </a:accent5>
+      <a:accent6>
+        <a:srgbClr val="F79646"/>
+      </a:accent6>
+      <a:hlink>
+        <a:srgbClr val="0000FF"/>
+      </a:hlink>
+      <a:folHlink>
+        <a:srgbClr val="800080"/>
+      </a:folHlink>
+    </a:clrScheme>
+    <a:fontScheme name="Office">
+      <a:majorFont>
+        <a:latin typeface="Calibri"/>
+        <a:ea typeface=""/>
+        <a:cs typeface=""/>
+        <a:font script="Jpan" typeface="ＭＳ Ｐゴシック"/>
+        <a:font script="Hang" typeface="맑은 고딕"/>
+        <a:font script="Hans" typeface="宋体"/>
+        <a:font script="Hant" typeface="新細明體"/>
+        <a:font script="Arab" typeface="Times New Roman"/>
+        <a:font script="Hebr" typeface="Times New Roman"/>
+        <a:font script="Thai" typeface="Angsana New"/>
+        <a:font script="Ethi" typeface="Nyala"/>
+        <a:font script="Beng" typeface="Vrinda"/>
+        <a:font script="Gujr" typeface="Shruti"/>
+        <a:font script="Khmr" typeface="MoolBoran"/>
+        <a:font script="Knda" typeface="Tunga"/>
+        <a:font script="Guru" typeface="Raavi"/>
+        <a:font script="Cans" typeface="Euphemia"/>
+        <a:font script="Cher" typeface="Plantagenet Cherokee"/>
+        <a:font script="Yiii" typeface="Microsoft Yi Baiti"/>
+        <a:font script="Tibt" typeface="Microsoft Himalaya"/>
+        <a:font script="Thaa" typeface="MV Boli"/>
+        <a:font script="Deva" typeface="Mangal"/>
+        <a:font script="Telu" typeface="Gautami"/>
+        <a:font script="Taml" typeface="Latha"/>
+        <a:font script="Syrc" typeface="Estrangelo Edessa"/>
+        <a:font script="Orya" typeface="Kalinga"/>
+        <a:font script="Mlym" typeface="Kartika"/>
+        <a:font script="Laoo" typeface="DokChampa"/>
+        <a:font script="Sinh" typeface="Iskoola Pota"/>
+        <a:font script="Mong" typeface="Mongolian Baiti"/>
+        <a:font script="Viet" typeface="Times New Roman"/>
+        <a:font script="Uigh" typeface="Microsoft Uighur"/>
+        <a:font script="Geor" typeface="Sylfaen"/>
+      </a:majorFont>
+      <a:minorFont>
+        <a:latin typeface="Calibri"/>
+        <a:ea typeface=""/>
+        <a:cs typeface=""/>
+        <a:font script="Jpan" typeface="ＭＳ Ｐゴシック"/>
+        <a:font script="Hang" typeface="맑은 고딕"/>
+        <a:font script="Hans" typeface="宋体"/>
+        <a:font script="Hant" typeface="新細明體"/>
+        <a:font script="Arab" typeface="Arial"/>
+        <a:font script="Hebr" typeface="Arial"/>
+        <a:font script="Thai" typeface="Cordia New"/>
+        <a:font script="Ethi" typeface="Nyala"/>
+        <a:font script="Beng" typeface="Vrinda"/>
+        <a:font script="Gujr" typeface="Shruti"/>
+        <a:font script="Khmr" typeface="DaunPenh"/>
+        <a:font script="Knda" typeface="Tunga"/>
+        <a:font script="Guru" typeface="Raavi"/>
+        <a:font script="Cans" typeface="Euphemia"/>
+        <a:font script="Cher" typeface="Plantagenet Cherokee"/>
+        <a:font script="Yiii" typeface="Microsoft Yi Baiti"/>
+        <a:font script="Tibt" typeface="Microsoft Himalaya"/>
+        <a:font script="Thaa" typeface="MV Boli"/>
+        <a:font script="Deva" typeface="Mangal"/>
+        <a:font script="Telu" typeface="Gautami"/>
+        <a:font script="Taml" typeface="Latha"/>
+        <a:font script="Syrc" typeface="Estrangelo Edessa"/>
+        <a:font script="Orya" typeface="Kalinga"/>
+        <a:font script="Mlym" typeface="Kartika"/>
+        <a:font script="Laoo" typeface="DokChampa"/>
+        <a:font script="Sinh" typeface="Iskoola Pota"/>
+        <a:font script="Mong" typeface="Mongolian Baiti"/>
+        <a:font script="Viet" typeface="Arial"/>
+        <a:font script="Uigh" typeface="Microsoft Uighur"/>
+        <a:font script="Geor" typeface="Sylfaen"/>
+      </a:minorFont>
+    </a:fontScheme>
+    <a:fmtScheme name="Office">
+      <a:fillStyleLst>
+        <a:solidFill>
+          <a:schemeClr val="phClr"/>
+        </a:solidFill>
+        <a:gradFill rotWithShape="1">
+          <a:gsLst>
+            <a:gs pos="0">
+              <a:schemeClr val="phClr">
+                <a:tint val="50000"/>
+                <a:satMod val="300000"/>
+              </a:schemeClr>
+            </a:gs>
+            <a:gs pos="35000">
+              <a:schemeClr val="phClr">
+                <a:tint val="37000"/>
+                <a:satMod val="300000"/>
+              </a:schemeClr>
+            </a:gs>
+            <a:gs pos="100000">
+              <a:schemeClr val="phClr">
+                <a:tint val="15000"/>
+                <a:satMod val="350000"/>
+              </a:schemeClr>
+            </a:gs>
+          </a:gsLst>
+          <a:lin ang="16200000" scaled="1"/>
+        </a:gradFill>
+        <a:gradFill rotWithShape="1">
+          <a:gsLst>
+            <a:gs pos="0">
+              <a:schemeClr val="phClr">
+                <a:tint val="100000"/>
+                <a:shade val="100000"/>
+                <a:satMod val="130000"/>
+              </a:schemeClr>
+            </a:gs>
+            <a:gs pos="100000">
+              <a:schemeClr val="phClr">
+                <a:tint val="50000"/>
+                <a:shade val="100000"/>
+                <a:satMod val="350000"/>
+              </a:schemeClr>
+            </a:gs>
+          </a:gsLst>
+          <a:lin ang="16200000" scaled="0"/>
+        </a:gradFill>
+      </a:fillStyleLst>
+      <a:lnStyleLst>
+        <a:ln w="9525" cap="flat" cmpd="sng" algn="ctr">
+          <a:solidFill>
+            <a:schemeClr val="phClr">
+              <a:shade val="95000"/>
+              <a:satMod val="105000"/>
+            </a:schemeClr>
+          </a:solidFill>
+          <a:prstDash val="solid"/>
+        </a:ln>
+        <a:ln w="25400" cap="flat" cmpd="sng" algn="ctr">
+          <a:solidFill>
+            <a:schemeClr val="phClr"/>
+          </a:solidFill>
+          <a:prstDash val="solid"/>
+        </a:ln>
+        <a:ln w="38100" cap="flat" cmpd="sng" algn="ctr">
+          <a:solidFill>
+            <a:schemeClr val="phClr"/>
+          </a:solidFill>
+          <a:prstDash val="solid"/>
+        </a:ln>
+      </a:lnStyleLst>
+      <a:effectStyleLst>
+        <a:effectStyle>
+          <a:effectLst>
+            <a:outerShdw blurRad="40000" dist="20000" dir="5400000" rotWithShape="0">
+              <a:srgbClr val="000000">
+                <a:alpha val="38000"/>
+              </a:srgbClr>
+            </a:outerShdw>
+          </a:effectLst>
+        </a:effectStyle>
+        <a:effectStyle>
+          <a:effectLst>
+            <a:outerShdw blurRad="40000" dist="23000" dir="5400000" rotWithShape="0">
+              <a:srgbClr val="000000">
+                <a:alpha val="35000"/>
+              </a:srgbClr>
+            </a:outerShdw>
+          </a:effectLst>
+        </a:effectStyle>
+        <a:effectStyle>
+          <a:effectLst>
+            <a:outerShdw blurRad="40000" dist="23000" dir="5400000" rotWithShape="0">
+              <a:srgbClr val="000000">
+                <a:alpha val="35000"/>
+              </a:srgbClr>
+            </a:outerShdw>
+          </a:effectLst>
+          <a:scene3d>
+            <a:camera prst="orthographicFront">
+              <a:rot lat="0" lon="0" rev="0"/>
+            </a:camera>
+            <a:lightRig rig="threePt" dir="t">
+              <a:rot lat="0" lon="0" rev="1200000"/>
+            </a:lightRig>
+          </a:scene3d>
+          <a:sp3d>
+            <a:bevelT w="63500" h="25400"/>
+          </a:sp3d>
+        </a:effectStyle>
+      </a:effectStyleLst>
+      <a:bgFillStyleLst>
+        <a:solidFill>
+          <a:schemeClr val="phClr"/>
+        </a:solidFill>
+        <a:gradFill rotWithShape="1">
+          <a:gsLst>
+            <a:gs pos="0">
+              <a:schemeClr val="phClr">
+                <a:tint val="40000"/>
+                <a:satMod val="350000"/>
+              </a:schemeClr>
+            </a:gs>
+            <a:gs pos="40000">
+              <a:schemeClr val="phClr">
+                <a:tint val="45000"/>
+                <a:shade val="99000"/>
+                <a:satMod val="350000"/>
+              </a:schemeClr>
+            </a:gs>
+            <a:gs pos="100000">
+              <a:schemeClr val="phClr">
+                <a:shade val="20000"/>
+                <a:satMod val="255000"/>
+              </a:schemeClr>
+            </a:gs>
+          </a:gsLst>
+          <a:path path="circle">
+            <a:fillToRect l="50000" t="-80000" r="50000" b="180000"/>
+          </a:path>
+        </a:gradFill>
+        <a:gradFill rotWithShape="1">
+          <a:gsLst>
+            <a:gs pos="0">
+              <a:schemeClr val="phClr">
+                <a:tint val="80000"/>
+                <a:satMod val="300000"/>
+              </a:schemeClr>
+            </a:gs>
+            <a:gs pos="100000">
+              <a:schemeClr val="phClr">
+                <a:shade val="30000"/>
+                <a:satMod val="200000"/>
+              </a:schemeClr>
+            </a:gs>
+          </a:gsLst>
+          <a:path path="circle">
+            <a:fillToRect l="50000" t="50000" r="50000" b="50000"/>
+          </a:path>
+        </a:gradFill>
+      </a:bgFillStyleLst>
+    </a:fmtScheme>
+  </a:themeElements>
+  <a:objectDefaults>
+    <a:spDef>
+      <a:spPr/>
+      <a:bodyPr/>
+      <a:lstStyle/>
+      <a:style>
+        <a:lnRef idx="1">
+          <a:schemeClr val="accent1"/>
+        </a:lnRef>
+        <a:fillRef idx="3">
+          <a:schemeClr val="accent1"/>
+        </a:fillRef>
+        <a:effectRef idx="2">
+          <a:schemeClr val="accent1"/>
+        </a:effectRef>
+        <a:fontRef idx="minor">
+          <a:schemeClr val="lt1"/>
+        </a:fontRef>
+      </a:style>
+    </a:spDef>
+    <a:lnDef>
+      <a:spPr/>
+      <a:bodyPr/>
+      <a:lstStyle/>
+      <a:style>
+        <a:lnRef idx="2">
+          <a:schemeClr val="accent1"/>
+        </a:lnRef>
+        <a:fillRef idx="0">
+          <a:schemeClr val="accent1"/>
+        </a:fillRef>
+        <a:effectRef idx="1">
+          <a:schemeClr val="accent1"/>
+        </a:effectRef>
+        <a:fontRef idx="minor">
+          <a:schemeClr val="tx1"/>
+        </a:fontRef>
+      </a:style>
+    </a:lnDef>
+  </a:objectDefaults>
+  <a:extraClrSchemeLst/>
+</a:theme>
 </file>
</xml_diff>

<commit_message>
Continued on with final-project ppt
</commit_message>
<xml_diff>
--- a/final-project.pptx
+++ b/final-project.pptx
@@ -5,23 +5,27 @@
     <p:sldMasterId id="2147483744" r:id="rId1"/>
   </p:sldMasterIdLst>
   <p:notesMasterIdLst>
-    <p:notesMasterId r:id="rId16"/>
+    <p:notesMasterId r:id="rId20"/>
   </p:notesMasterIdLst>
   <p:sldIdLst>
     <p:sldId id="256" r:id="rId2"/>
     <p:sldId id="257" r:id="rId3"/>
     <p:sldId id="258" r:id="rId4"/>
-    <p:sldId id="259" r:id="rId5"/>
-    <p:sldId id="260" r:id="rId6"/>
-    <p:sldId id="272" r:id="rId7"/>
-    <p:sldId id="266" r:id="rId8"/>
-    <p:sldId id="270" r:id="rId9"/>
-    <p:sldId id="267" r:id="rId10"/>
-    <p:sldId id="268" r:id="rId11"/>
-    <p:sldId id="269" r:id="rId12"/>
-    <p:sldId id="261" r:id="rId13"/>
-    <p:sldId id="263" r:id="rId14"/>
-    <p:sldId id="264" r:id="rId15"/>
+    <p:sldId id="274" r:id="rId5"/>
+    <p:sldId id="276" r:id="rId6"/>
+    <p:sldId id="275" r:id="rId7"/>
+    <p:sldId id="273" r:id="rId8"/>
+    <p:sldId id="259" r:id="rId9"/>
+    <p:sldId id="260" r:id="rId10"/>
+    <p:sldId id="272" r:id="rId11"/>
+    <p:sldId id="266" r:id="rId12"/>
+    <p:sldId id="270" r:id="rId13"/>
+    <p:sldId id="267" r:id="rId14"/>
+    <p:sldId id="268" r:id="rId15"/>
+    <p:sldId id="269" r:id="rId16"/>
+    <p:sldId id="261" r:id="rId17"/>
+    <p:sldId id="263" r:id="rId18"/>
+    <p:sldId id="264" r:id="rId19"/>
   </p:sldIdLst>
   <p:sldSz cx="9144000" cy="6858000" type="screen4x3"/>
   <p:notesSz cx="6858000" cy="9144000"/>
@@ -132,6 +136,10 @@
         <p14:section name="Architecture" id="{95531673-C009-C64E-BF20-A9CF0E063963}">
           <p14:sldIdLst>
             <p14:sldId id="258"/>
+            <p14:sldId id="274"/>
+            <p14:sldId id="276"/>
+            <p14:sldId id="275"/>
+            <p14:sldId id="273"/>
           </p14:sldIdLst>
         </p14:section>
         <p14:section name="Languages" id="{725A71C3-1E09-644D-9A01-2C765163B187}">
@@ -570,22 +578,8 @@
               <a:buChar char="•"/>
             </a:pPr>
             <a:r>
-              <a:rPr lang="en-US" dirty="0" err="1" smtClean="0"/>
-              <a:t>JetBrains</a:t>
-            </a:r>
-            <a:r>
-              <a:rPr lang="en-US" dirty="0" smtClean="0"/>
-              <a:t> Java IDE</a:t>
-            </a:r>
-          </a:p>
-          <a:p>
-            <a:pPr marL="171450" indent="-171450">
-              <a:buFont typeface="Arial"/>
-              <a:buChar char="•"/>
-            </a:pPr>
-            <a:r>
-              <a:rPr lang="en-US" dirty="0" smtClean="0"/>
-              <a:t>Supports all aspects of the build process</a:t>
+              <a:rPr lang="en-US" dirty="0" smtClean="0"/>
+              <a:t>Model</a:t>
             </a:r>
           </a:p>
           <a:p>
@@ -595,7 +589,21 @@
             </a:pPr>
             <a:r>
               <a:rPr lang="en-US" dirty="0" smtClean="0"/>
-              <a:t>Coding - edit, compile build</a:t>
+              <a:t>JSON</a:t>
+            </a:r>
+            <a:r>
+              <a:rPr lang="en-US" baseline="0" dirty="0" smtClean="0"/>
+              <a:t> and database</a:t>
+            </a:r>
+          </a:p>
+          <a:p>
+            <a:pPr marL="171450" lvl="0" indent="-171450">
+              <a:buFont typeface="Arial"/>
+              <a:buChar char="•"/>
+            </a:pPr>
+            <a:r>
+              <a:rPr lang="en-US" baseline="0" dirty="0" smtClean="0"/>
+              <a:t>Repository</a:t>
             </a:r>
           </a:p>
           <a:p>
@@ -604,16 +612,18 @@
               <a:buChar char="•"/>
             </a:pPr>
             <a:r>
-              <a:rPr lang="en-US" dirty="0" smtClean="0"/>
-              <a:t>Standard library support (</a:t>
-            </a:r>
-            <a:r>
-              <a:rPr lang="en-US" dirty="0" err="1" smtClean="0"/>
-              <a:t>eg</a:t>
-            </a:r>
-            <a:r>
-              <a:rPr lang="en-US" dirty="0" smtClean="0"/>
-              <a:t>. Spring)</a:t>
+              <a:rPr lang="en-US" baseline="0" dirty="0" smtClean="0"/>
+              <a:t>Database interaction</a:t>
+            </a:r>
+          </a:p>
+          <a:p>
+            <a:pPr marL="171450" lvl="0" indent="-171450">
+              <a:buFont typeface="Arial"/>
+              <a:buChar char="•"/>
+            </a:pPr>
+            <a:r>
+              <a:rPr lang="en-US" baseline="0" dirty="0" smtClean="0"/>
+              <a:t>Rest</a:t>
             </a:r>
           </a:p>
           <a:p>
@@ -622,24 +632,18 @@
               <a:buChar char="•"/>
             </a:pPr>
             <a:r>
-              <a:rPr lang="en-US" dirty="0" smtClean="0"/>
-              <a:t>Standard tool support (</a:t>
-            </a:r>
-            <a:r>
-              <a:rPr lang="en-US" dirty="0" err="1" smtClean="0"/>
-              <a:t>eg</a:t>
-            </a:r>
-            <a:r>
-              <a:rPr lang="en-US" dirty="0" smtClean="0"/>
-              <a:t>. </a:t>
-            </a:r>
-            <a:r>
-              <a:rPr lang="en-US" dirty="0" err="1" smtClean="0"/>
-              <a:t>Gradle</a:t>
-            </a:r>
-            <a:r>
-              <a:rPr lang="en-US" dirty="0" smtClean="0"/>
-              <a:t>)</a:t>
+              <a:rPr lang="en-US" baseline="0" dirty="0" smtClean="0"/>
+              <a:t>Rest service endpoints</a:t>
+            </a:r>
+          </a:p>
+          <a:p>
+            <a:pPr marL="171450" lvl="0" indent="-171450">
+              <a:buFont typeface="Arial"/>
+              <a:buChar char="•"/>
+            </a:pPr>
+            <a:r>
+              <a:rPr lang="en-US" baseline="0" dirty="0" smtClean="0"/>
+              <a:t>Security</a:t>
             </a:r>
           </a:p>
           <a:p>
@@ -648,8 +652,23 @@
               <a:buChar char="•"/>
             </a:pPr>
             <a:r>
-              <a:rPr lang="en-US" dirty="0" smtClean="0"/>
-              <a:t>Source control interaction</a:t>
+              <a:rPr lang="en-US" baseline="0" dirty="0" smtClean="0"/>
+              <a:t>Classes supporting the BASIC </a:t>
+            </a:r>
+            <a:r>
+              <a:rPr lang="en-US" baseline="0" dirty="0" err="1" smtClean="0"/>
+              <a:t>Auth</a:t>
+            </a:r>
+            <a:endParaRPr lang="en-US" baseline="0" dirty="0" smtClean="0"/>
+          </a:p>
+          <a:p>
+            <a:pPr marL="171450" lvl="0" indent="-171450">
+              <a:buFont typeface="Arial"/>
+              <a:buChar char="•"/>
+            </a:pPr>
+            <a:r>
+              <a:rPr lang="en-US" baseline="0" dirty="0" smtClean="0"/>
+              <a:t>Utility</a:t>
             </a:r>
           </a:p>
           <a:p>
@@ -659,14 +678,12 @@
             </a:pPr>
             <a:r>
               <a:rPr lang="en-US" dirty="0" smtClean="0"/>
-              <a:t>Database modeling and interaction</a:t>
-            </a:r>
-          </a:p>
-          <a:p>
-            <a:pPr marL="171450" indent="-171450">
-              <a:buFont typeface="Arial"/>
-              <a:buChar char="•"/>
-            </a:pPr>
+              <a:t>Helper classes like String resources and Logging</a:t>
+            </a:r>
+            <a:r>
+              <a:rPr lang="en-US" baseline="0" dirty="0" smtClean="0"/>
+              <a:t> Facade</a:t>
+            </a:r>
             <a:endParaRPr lang="en-US" dirty="0"/>
           </a:p>
         </p:txBody>
@@ -688,7 +705,7 @@
           <a:p>
             <a:fld id="{343EC50C-9F72-2145-B639-B6AAF286F007}" type="slidenum">
               <a:rPr lang="en-US" smtClean="0"/>
-              <a:t>6</a:t>
+              <a:t>5</a:t>
             </a:fld>
             <a:endParaRPr lang="en-US"/>
           </a:p>
@@ -697,7 +714,7 @@
     </p:spTree>
     <p:extLst>
       <p:ext uri="{BB962C8B-B14F-4D97-AF65-F5344CB8AC3E}">
-        <p14:creationId xmlns:p14="http://schemas.microsoft.com/office/powerpoint/2010/main" val="1728622765"/>
+        <p14:creationId xmlns:p14="http://schemas.microsoft.com/office/powerpoint/2010/main" val="1991892265"/>
       </p:ext>
     </p:extLst>
   </p:cSld>
@@ -757,30 +774,137 @@
             </a:pPr>
             <a:r>
               <a:rPr lang="en-US" dirty="0" smtClean="0"/>
-              <a:t>Visual GUI builder</a:t>
-            </a:r>
-          </a:p>
-          <a:p>
-            <a:pPr marL="171450" indent="-171450">
+              <a:t>Model</a:t>
+            </a:r>
+          </a:p>
+          <a:p>
+            <a:pPr marL="628650" lvl="1" indent="-171450">
               <a:buFont typeface="Arial"/>
               <a:buChar char="•"/>
             </a:pPr>
             <a:r>
               <a:rPr lang="en-US" dirty="0" smtClean="0"/>
-              <a:t>Facilitates layout visually</a:t>
-            </a:r>
-          </a:p>
-          <a:p>
-            <a:pPr marL="171450" indent="-171450">
+              <a:t>JSON</a:t>
+            </a:r>
+          </a:p>
+          <a:p>
+            <a:pPr marL="171450" lvl="0" indent="-171450">
               <a:buFont typeface="Arial"/>
               <a:buChar char="•"/>
             </a:pPr>
             <a:r>
               <a:rPr lang="en-US" dirty="0" smtClean="0"/>
-              <a:t>Outputs XML that is consumed by the application</a:t>
-            </a:r>
-          </a:p>
-          <a:p>
+              <a:t>View</a:t>
+            </a:r>
+          </a:p>
+          <a:p>
+            <a:pPr marL="628650" lvl="1" indent="-171450">
+              <a:buFont typeface="Arial"/>
+              <a:buChar char="•"/>
+            </a:pPr>
+            <a:r>
+              <a:rPr lang="en-US" dirty="0" smtClean="0"/>
+              <a:t>FXML Resources</a:t>
+            </a:r>
+          </a:p>
+          <a:p>
+            <a:pPr marL="171450" lvl="0" indent="-171450">
+              <a:buFont typeface="Arial"/>
+              <a:buChar char="•"/>
+            </a:pPr>
+            <a:r>
+              <a:rPr lang="en-US" dirty="0" smtClean="0"/>
+              <a:t>Controller</a:t>
+            </a:r>
+          </a:p>
+          <a:p>
+            <a:pPr marL="628650" lvl="1" indent="-171450">
+              <a:buFont typeface="Arial"/>
+              <a:buChar char="•"/>
+            </a:pPr>
+            <a:r>
+              <a:rPr lang="en-US" dirty="0" smtClean="0"/>
+              <a:t>Interaction between view and model</a:t>
+            </a:r>
+          </a:p>
+          <a:p>
+            <a:pPr marL="628650" lvl="1" indent="-171450">
+              <a:buFont typeface="Arial"/>
+              <a:buChar char="•"/>
+            </a:pPr>
+            <a:r>
+              <a:rPr lang="en-US" dirty="0" smtClean="0"/>
+              <a:t>Handles user interaction</a:t>
+            </a:r>
+          </a:p>
+          <a:p>
+            <a:pPr marL="171450" lvl="0" indent="-171450">
+              <a:buFont typeface="Arial"/>
+              <a:buChar char="•"/>
+            </a:pPr>
+            <a:r>
+              <a:rPr lang="en-US" dirty="0" smtClean="0"/>
+              <a:t>Service</a:t>
+            </a:r>
+          </a:p>
+          <a:p>
+            <a:pPr marL="628650" lvl="1" indent="-171450">
+              <a:buFont typeface="Arial"/>
+              <a:buChar char="•"/>
+            </a:pPr>
+            <a:r>
+              <a:rPr lang="en-US" dirty="0" smtClean="0"/>
+              <a:t>Application</a:t>
+            </a:r>
+            <a:r>
+              <a:rPr lang="en-US" baseline="0" dirty="0" smtClean="0"/>
+              <a:t> services especially making rest </a:t>
+            </a:r>
+            <a:r>
+              <a:rPr lang="en-US" baseline="0" dirty="0" err="1" smtClean="0"/>
+              <a:t>calss</a:t>
+            </a:r>
+            <a:endParaRPr lang="en-US" baseline="0" dirty="0" smtClean="0"/>
+          </a:p>
+          <a:p>
+            <a:pPr marL="171450" lvl="0" indent="-171450">
+              <a:buFont typeface="Arial"/>
+              <a:buChar char="•"/>
+            </a:pPr>
+            <a:r>
+              <a:rPr lang="en-US" baseline="0" dirty="0" smtClean="0"/>
+              <a:t>Utility</a:t>
+            </a:r>
+          </a:p>
+          <a:p>
+            <a:pPr marL="628650" lvl="1" indent="-171450">
+              <a:buFont typeface="Arial"/>
+              <a:buChar char="•"/>
+            </a:pPr>
+            <a:r>
+              <a:rPr lang="en-US" baseline="0" dirty="0" smtClean="0"/>
+              <a:t>Helper classes like string resources and image resources</a:t>
+            </a:r>
+          </a:p>
+          <a:p>
+            <a:pPr marL="628650" lvl="1" indent="-171450">
+              <a:buFont typeface="Arial"/>
+              <a:buChar char="•"/>
+            </a:pPr>
+            <a:r>
+              <a:rPr lang="en-US" baseline="0" dirty="0" smtClean="0"/>
+              <a:t>Thread executors</a:t>
+            </a:r>
+          </a:p>
+          <a:p>
+            <a:pPr marL="628650" lvl="1" indent="-171450">
+              <a:buFont typeface="Arial"/>
+              <a:buChar char="•"/>
+            </a:pPr>
+            <a:r>
+              <a:rPr lang="en-US" baseline="0" dirty="0" smtClean="0"/>
+              <a:t>Form validators</a:t>
+            </a:r>
             <a:endParaRPr lang="en-US" dirty="0"/>
           </a:p>
         </p:txBody>
@@ -802,7 +926,7 @@
           <a:p>
             <a:fld id="{343EC50C-9F72-2145-B639-B6AAF286F007}" type="slidenum">
               <a:rPr lang="en-US" smtClean="0"/>
-              <a:t>7</a:t>
+              <a:t>6</a:t>
             </a:fld>
             <a:endParaRPr lang="en-US"/>
           </a:p>
@@ -811,7 +935,7 @@
     </p:spTree>
     <p:extLst>
       <p:ext uri="{BB962C8B-B14F-4D97-AF65-F5344CB8AC3E}">
-        <p14:creationId xmlns:p14="http://schemas.microsoft.com/office/powerpoint/2010/main" val="3484450956"/>
+        <p14:creationId xmlns:p14="http://schemas.microsoft.com/office/powerpoint/2010/main" val="329249980"/>
       </p:ext>
     </p:extLst>
   </p:cSld>
@@ -870,8 +994,12 @@
               <a:buChar char="•"/>
             </a:pPr>
             <a:r>
-              <a:rPr lang="en-US" dirty="0" smtClean="0"/>
-              <a:t>Build tool</a:t>
+              <a:rPr lang="en-US" dirty="0" err="1" smtClean="0"/>
+              <a:t>JetBrains</a:t>
+            </a:r>
+            <a:r>
+              <a:rPr lang="en-US" dirty="0" smtClean="0"/>
+              <a:t> Java IDE</a:t>
             </a:r>
           </a:p>
           <a:p>
@@ -881,7 +1009,81 @@
             </a:pPr>
             <a:r>
               <a:rPr lang="en-US" dirty="0" smtClean="0"/>
-              <a:t>Dependency management</a:t>
+              <a:t>Supports all aspects of the build process</a:t>
+            </a:r>
+          </a:p>
+          <a:p>
+            <a:pPr marL="628650" lvl="1" indent="-171450">
+              <a:buFont typeface="Arial"/>
+              <a:buChar char="•"/>
+            </a:pPr>
+            <a:r>
+              <a:rPr lang="en-US" dirty="0" smtClean="0"/>
+              <a:t>Coding - edit, compile build</a:t>
+            </a:r>
+          </a:p>
+          <a:p>
+            <a:pPr marL="628650" lvl="1" indent="-171450">
+              <a:buFont typeface="Arial"/>
+              <a:buChar char="•"/>
+            </a:pPr>
+            <a:r>
+              <a:rPr lang="en-US" dirty="0" smtClean="0"/>
+              <a:t>Standard library support (</a:t>
+            </a:r>
+            <a:r>
+              <a:rPr lang="en-US" dirty="0" err="1" smtClean="0"/>
+              <a:t>eg</a:t>
+            </a:r>
+            <a:r>
+              <a:rPr lang="en-US" dirty="0" smtClean="0"/>
+              <a:t>. Spring)</a:t>
+            </a:r>
+          </a:p>
+          <a:p>
+            <a:pPr marL="628650" lvl="1" indent="-171450">
+              <a:buFont typeface="Arial"/>
+              <a:buChar char="•"/>
+            </a:pPr>
+            <a:r>
+              <a:rPr lang="en-US" dirty="0" smtClean="0"/>
+              <a:t>Standard tool support (</a:t>
+            </a:r>
+            <a:r>
+              <a:rPr lang="en-US" dirty="0" err="1" smtClean="0"/>
+              <a:t>eg</a:t>
+            </a:r>
+            <a:r>
+              <a:rPr lang="en-US" dirty="0" smtClean="0"/>
+              <a:t>. </a:t>
+            </a:r>
+            <a:r>
+              <a:rPr lang="en-US" dirty="0" err="1" smtClean="0"/>
+              <a:t>Gradle</a:t>
+            </a:r>
+            <a:r>
+              <a:rPr lang="en-US" dirty="0" smtClean="0"/>
+              <a:t>)</a:t>
+            </a:r>
+          </a:p>
+          <a:p>
+            <a:pPr marL="628650" lvl="1" indent="-171450">
+              <a:buFont typeface="Arial"/>
+              <a:buChar char="•"/>
+            </a:pPr>
+            <a:r>
+              <a:rPr lang="en-US" dirty="0" smtClean="0"/>
+              <a:t>Source control interaction</a:t>
+            </a:r>
+          </a:p>
+          <a:p>
+            <a:pPr marL="628650" lvl="1" indent="-171450">
+              <a:buFont typeface="Arial"/>
+              <a:buChar char="•"/>
+            </a:pPr>
+            <a:r>
+              <a:rPr lang="en-US" dirty="0" smtClean="0"/>
+              <a:t>Database modeling and interaction</a:t>
             </a:r>
           </a:p>
           <a:p>
@@ -889,32 +1091,6 @@
               <a:buFont typeface="Arial"/>
               <a:buChar char="•"/>
             </a:pPr>
-            <a:r>
-              <a:rPr lang="en-US" dirty="0" smtClean="0"/>
-              <a:t>Task runner</a:t>
-            </a:r>
-          </a:p>
-          <a:p>
-            <a:pPr marL="171450" indent="-171450">
-              <a:buFont typeface="Arial"/>
-              <a:buChar char="•"/>
-            </a:pPr>
-            <a:r>
-              <a:rPr lang="en-US" dirty="0" smtClean="0"/>
-              <a:t>Groovy build scripts</a:t>
-            </a:r>
-          </a:p>
-          <a:p>
-            <a:pPr marL="171450" indent="-171450">
-              <a:buFont typeface="Arial"/>
-              <a:buChar char="•"/>
-            </a:pPr>
-            <a:r>
-              <a:rPr lang="en-US" dirty="0" smtClean="0"/>
-              <a:t>Rich plugin architecture</a:t>
-            </a:r>
-          </a:p>
-          <a:p>
             <a:endParaRPr lang="en-US" dirty="0"/>
           </a:p>
         </p:txBody>
@@ -936,7 +1112,7 @@
           <a:p>
             <a:fld id="{343EC50C-9F72-2145-B639-B6AAF286F007}" type="slidenum">
               <a:rPr lang="en-US" smtClean="0"/>
-              <a:t>9</a:t>
+              <a:t>10</a:t>
             </a:fld>
             <a:endParaRPr lang="en-US"/>
           </a:p>
@@ -945,7 +1121,7 @@
     </p:spTree>
     <p:extLst>
       <p:ext uri="{BB962C8B-B14F-4D97-AF65-F5344CB8AC3E}">
-        <p14:creationId xmlns:p14="http://schemas.microsoft.com/office/powerpoint/2010/main" val="4294615101"/>
+        <p14:creationId xmlns:p14="http://schemas.microsoft.com/office/powerpoint/2010/main" val="1728622765"/>
       </p:ext>
     </p:extLst>
   </p:cSld>
@@ -1005,7 +1181,7 @@
             </a:pPr>
             <a:r>
               <a:rPr lang="en-US" dirty="0" smtClean="0"/>
-              <a:t>On line source repository</a:t>
+              <a:t>Visual GUI builder</a:t>
             </a:r>
           </a:p>
           <a:p>
@@ -1013,6 +1189,22 @@
               <a:buFont typeface="Arial"/>
               <a:buChar char="•"/>
             </a:pPr>
+            <a:r>
+              <a:rPr lang="en-US" dirty="0" smtClean="0"/>
+              <a:t>Facilitates layout visually</a:t>
+            </a:r>
+          </a:p>
+          <a:p>
+            <a:pPr marL="171450" indent="-171450">
+              <a:buFont typeface="Arial"/>
+              <a:buChar char="•"/>
+            </a:pPr>
+            <a:r>
+              <a:rPr lang="en-US" dirty="0" smtClean="0"/>
+              <a:t>Outputs XML that is consumed by the application</a:t>
+            </a:r>
+          </a:p>
+          <a:p>
             <a:endParaRPr lang="en-US" dirty="0"/>
           </a:p>
         </p:txBody>
@@ -1034,7 +1226,7 @@
           <a:p>
             <a:fld id="{343EC50C-9F72-2145-B639-B6AAF286F007}" type="slidenum">
               <a:rPr lang="en-US" smtClean="0"/>
-              <a:t>10</a:t>
+              <a:t>11</a:t>
             </a:fld>
             <a:endParaRPr lang="en-US"/>
           </a:p>
@@ -1043,7 +1235,7 @@
     </p:spTree>
     <p:extLst>
       <p:ext uri="{BB962C8B-B14F-4D97-AF65-F5344CB8AC3E}">
-        <p14:creationId xmlns:p14="http://schemas.microsoft.com/office/powerpoint/2010/main" val="1065552806"/>
+        <p14:creationId xmlns:p14="http://schemas.microsoft.com/office/powerpoint/2010/main" val="3484450956"/>
       </p:ext>
     </p:extLst>
   </p:cSld>
@@ -1103,19 +1295,7 @@
             </a:pPr>
             <a:r>
               <a:rPr lang="en-US" dirty="0" smtClean="0"/>
-              <a:t>Tool for</a:t>
-            </a:r>
-            <a:r>
-              <a:rPr lang="en-US" baseline="0" dirty="0" smtClean="0"/>
-              <a:t> visual interaction with </a:t>
-            </a:r>
-            <a:r>
-              <a:rPr lang="en-US" baseline="0" dirty="0" err="1" smtClean="0"/>
-              <a:t>git</a:t>
-            </a:r>
-            <a:r>
-              <a:rPr lang="en-US" baseline="0" dirty="0" smtClean="0"/>
-              <a:t> repositories</a:t>
+              <a:t>Build tool</a:t>
             </a:r>
           </a:p>
           <a:p>
@@ -1124,6 +1304,250 @@
               <a:buChar char="•"/>
             </a:pPr>
             <a:r>
+              <a:rPr lang="en-US" dirty="0" smtClean="0"/>
+              <a:t>Dependency management</a:t>
+            </a:r>
+          </a:p>
+          <a:p>
+            <a:pPr marL="171450" indent="-171450">
+              <a:buFont typeface="Arial"/>
+              <a:buChar char="•"/>
+            </a:pPr>
+            <a:r>
+              <a:rPr lang="en-US" dirty="0" smtClean="0"/>
+              <a:t>Task runner</a:t>
+            </a:r>
+          </a:p>
+          <a:p>
+            <a:pPr marL="171450" indent="-171450">
+              <a:buFont typeface="Arial"/>
+              <a:buChar char="•"/>
+            </a:pPr>
+            <a:r>
+              <a:rPr lang="en-US" dirty="0" smtClean="0"/>
+              <a:t>Groovy build scripts</a:t>
+            </a:r>
+          </a:p>
+          <a:p>
+            <a:pPr marL="171450" indent="-171450">
+              <a:buFont typeface="Arial"/>
+              <a:buChar char="•"/>
+            </a:pPr>
+            <a:r>
+              <a:rPr lang="en-US" dirty="0" smtClean="0"/>
+              <a:t>Rich plugin architecture</a:t>
+            </a:r>
+          </a:p>
+          <a:p>
+            <a:endParaRPr lang="en-US" dirty="0"/>
+          </a:p>
+        </p:txBody>
+      </p:sp>
+      <p:sp>
+        <p:nvSpPr>
+          <p:cNvPr id="4" name="Slide Number Placeholder 3"/>
+          <p:cNvSpPr>
+            <a:spLocks noGrp="1"/>
+          </p:cNvSpPr>
+          <p:nvPr>
+            <p:ph type="sldNum" sz="quarter" idx="10"/>
+          </p:nvPr>
+        </p:nvSpPr>
+        <p:spPr/>
+        <p:txBody>
+          <a:bodyPr/>
+          <a:lstStyle/>
+          <a:p>
+            <a:fld id="{343EC50C-9F72-2145-B639-B6AAF286F007}" type="slidenum">
+              <a:rPr lang="en-US" smtClean="0"/>
+              <a:t>13</a:t>
+            </a:fld>
+            <a:endParaRPr lang="en-US"/>
+          </a:p>
+        </p:txBody>
+      </p:sp>
+    </p:spTree>
+    <p:extLst>
+      <p:ext uri="{BB962C8B-B14F-4D97-AF65-F5344CB8AC3E}">
+        <p14:creationId xmlns:p14="http://schemas.microsoft.com/office/powerpoint/2010/main" val="4294615101"/>
+      </p:ext>
+    </p:extLst>
+  </p:cSld>
+  <p:clrMapOvr>
+    <a:masterClrMapping/>
+  </p:clrMapOvr>
+</p:notes>
+</file>
+
+<file path=ppt/notesSlides/notesSlide6.xml><?xml version="1.0" encoding="utf-8"?>
+<p:notes xmlns:a="http://schemas.openxmlformats.org/drawingml/2006/main" xmlns:r="http://schemas.openxmlformats.org/officeDocument/2006/relationships" xmlns:p="http://schemas.openxmlformats.org/presentationml/2006/main">
+  <p:cSld>
+    <p:spTree>
+      <p:nvGrpSpPr>
+        <p:cNvPr id="1" name=""/>
+        <p:cNvGrpSpPr/>
+        <p:nvPr/>
+      </p:nvGrpSpPr>
+      <p:grpSpPr>
+        <a:xfrm>
+          <a:off x="0" y="0"/>
+          <a:ext cx="0" cy="0"/>
+          <a:chOff x="0" y="0"/>
+          <a:chExt cx="0" cy="0"/>
+        </a:xfrm>
+      </p:grpSpPr>
+      <p:sp>
+        <p:nvSpPr>
+          <p:cNvPr id="2" name="Slide Image Placeholder 1"/>
+          <p:cNvSpPr>
+            <a:spLocks noGrp="1" noRot="1" noChangeAspect="1"/>
+          </p:cNvSpPr>
+          <p:nvPr>
+            <p:ph type="sldImg"/>
+          </p:nvPr>
+        </p:nvSpPr>
+        <p:spPr/>
+      </p:sp>
+      <p:sp>
+        <p:nvSpPr>
+          <p:cNvPr id="3" name="Notes Placeholder 2"/>
+          <p:cNvSpPr>
+            <a:spLocks noGrp="1"/>
+          </p:cNvSpPr>
+          <p:nvPr>
+            <p:ph type="body" idx="1"/>
+          </p:nvPr>
+        </p:nvSpPr>
+        <p:spPr/>
+        <p:txBody>
+          <a:bodyPr/>
+          <a:lstStyle/>
+          <a:p>
+            <a:pPr marL="171450" indent="-171450">
+              <a:buFont typeface="Arial"/>
+              <a:buChar char="•"/>
+            </a:pPr>
+            <a:r>
+              <a:rPr lang="en-US" dirty="0" smtClean="0"/>
+              <a:t>On line source repository</a:t>
+            </a:r>
+          </a:p>
+          <a:p>
+            <a:pPr marL="171450" indent="-171450">
+              <a:buFont typeface="Arial"/>
+              <a:buChar char="•"/>
+            </a:pPr>
+            <a:endParaRPr lang="en-US" dirty="0"/>
+          </a:p>
+        </p:txBody>
+      </p:sp>
+      <p:sp>
+        <p:nvSpPr>
+          <p:cNvPr id="4" name="Slide Number Placeholder 3"/>
+          <p:cNvSpPr>
+            <a:spLocks noGrp="1"/>
+          </p:cNvSpPr>
+          <p:nvPr>
+            <p:ph type="sldNum" sz="quarter" idx="10"/>
+          </p:nvPr>
+        </p:nvSpPr>
+        <p:spPr/>
+        <p:txBody>
+          <a:bodyPr/>
+          <a:lstStyle/>
+          <a:p>
+            <a:fld id="{343EC50C-9F72-2145-B639-B6AAF286F007}" type="slidenum">
+              <a:rPr lang="en-US" smtClean="0"/>
+              <a:t>14</a:t>
+            </a:fld>
+            <a:endParaRPr lang="en-US"/>
+          </a:p>
+        </p:txBody>
+      </p:sp>
+    </p:spTree>
+    <p:extLst>
+      <p:ext uri="{BB962C8B-B14F-4D97-AF65-F5344CB8AC3E}">
+        <p14:creationId xmlns:p14="http://schemas.microsoft.com/office/powerpoint/2010/main" val="1065552806"/>
+      </p:ext>
+    </p:extLst>
+  </p:cSld>
+  <p:clrMapOvr>
+    <a:masterClrMapping/>
+  </p:clrMapOvr>
+</p:notes>
+</file>
+
+<file path=ppt/notesSlides/notesSlide7.xml><?xml version="1.0" encoding="utf-8"?>
+<p:notes xmlns:a="http://schemas.openxmlformats.org/drawingml/2006/main" xmlns:r="http://schemas.openxmlformats.org/officeDocument/2006/relationships" xmlns:p="http://schemas.openxmlformats.org/presentationml/2006/main">
+  <p:cSld>
+    <p:spTree>
+      <p:nvGrpSpPr>
+        <p:cNvPr id="1" name=""/>
+        <p:cNvGrpSpPr/>
+        <p:nvPr/>
+      </p:nvGrpSpPr>
+      <p:grpSpPr>
+        <a:xfrm>
+          <a:off x="0" y="0"/>
+          <a:ext cx="0" cy="0"/>
+          <a:chOff x="0" y="0"/>
+          <a:chExt cx="0" cy="0"/>
+        </a:xfrm>
+      </p:grpSpPr>
+      <p:sp>
+        <p:nvSpPr>
+          <p:cNvPr id="2" name="Slide Image Placeholder 1"/>
+          <p:cNvSpPr>
+            <a:spLocks noGrp="1" noRot="1" noChangeAspect="1"/>
+          </p:cNvSpPr>
+          <p:nvPr>
+            <p:ph type="sldImg"/>
+          </p:nvPr>
+        </p:nvSpPr>
+        <p:spPr/>
+      </p:sp>
+      <p:sp>
+        <p:nvSpPr>
+          <p:cNvPr id="3" name="Notes Placeholder 2"/>
+          <p:cNvSpPr>
+            <a:spLocks noGrp="1"/>
+          </p:cNvSpPr>
+          <p:nvPr>
+            <p:ph type="body" idx="1"/>
+          </p:nvPr>
+        </p:nvSpPr>
+        <p:spPr/>
+        <p:txBody>
+          <a:bodyPr/>
+          <a:lstStyle/>
+          <a:p>
+            <a:pPr marL="171450" indent="-171450">
+              <a:buFont typeface="Arial"/>
+              <a:buChar char="•"/>
+            </a:pPr>
+            <a:r>
+              <a:rPr lang="en-US" dirty="0" smtClean="0"/>
+              <a:t>Tool for</a:t>
+            </a:r>
+            <a:r>
+              <a:rPr lang="en-US" baseline="0" dirty="0" smtClean="0"/>
+              <a:t> visual interaction with </a:t>
+            </a:r>
+            <a:r>
+              <a:rPr lang="en-US" baseline="0" dirty="0" err="1" smtClean="0"/>
+              <a:t>git</a:t>
+            </a:r>
+            <a:r>
+              <a:rPr lang="en-US" baseline="0" dirty="0" smtClean="0"/>
+              <a:t> repositories</a:t>
+            </a:r>
+          </a:p>
+          <a:p>
+            <a:pPr marL="171450" indent="-171450">
+              <a:buFont typeface="Arial"/>
+              <a:buChar char="•"/>
+            </a:pPr>
+            <a:r>
               <a:rPr lang="en-US" baseline="0" dirty="0" smtClean="0"/>
               <a:t>Provides great tools for:</a:t>
             </a:r>
@@ -1154,7 +1578,7 @@
               <a:buChar char="•"/>
             </a:pPr>
             <a:r>
-              <a:rPr lang="en-US" baseline="0" smtClean="0"/>
+              <a:rPr lang="en-US" baseline="0" dirty="0" smtClean="0"/>
               <a:t>File Diffs</a:t>
             </a:r>
           </a:p>
@@ -1177,7 +1601,7 @@
           <a:p>
             <a:fld id="{343EC50C-9F72-2145-B639-B6AAF286F007}" type="slidenum">
               <a:rPr lang="en-US" smtClean="0"/>
-              <a:t>11</a:t>
+              <a:t>15</a:t>
             </a:fld>
             <a:endParaRPr lang="en-US"/>
           </a:p>
@@ -5662,6 +6086,322 @@
       </p:grpSpPr>
       <p:sp>
         <p:nvSpPr>
+          <p:cNvPr id="3" name="Title 2"/>
+          <p:cNvSpPr>
+            <a:spLocks noGrp="1"/>
+          </p:cNvSpPr>
+          <p:nvPr>
+            <p:ph type="title"/>
+          </p:nvPr>
+        </p:nvSpPr>
+        <p:spPr/>
+        <p:txBody>
+          <a:bodyPr/>
+          <a:lstStyle/>
+          <a:p>
+            <a:r>
+              <a:rPr lang="en-US" dirty="0" err="1" smtClean="0"/>
+              <a:t>IntelliJ</a:t>
+            </a:r>
+            <a:endParaRPr lang="en-US" dirty="0"/>
+          </a:p>
+        </p:txBody>
+      </p:sp>
+      <p:pic>
+        <p:nvPicPr>
+          <p:cNvPr id="4" name="Picture 3"/>
+          <p:cNvPicPr>
+            <a:picLocks noChangeAspect="1"/>
+          </p:cNvPicPr>
+          <p:nvPr/>
+        </p:nvPicPr>
+        <p:blipFill>
+          <a:blip r:embed="rId3"/>
+          <a:stretch>
+            <a:fillRect/>
+          </a:stretch>
+        </p:blipFill>
+        <p:spPr>
+          <a:xfrm>
+            <a:off x="788998" y="2415864"/>
+            <a:ext cx="7572411" cy="4152995"/>
+          </a:xfrm>
+          <a:prstGeom prst="rect">
+            <a:avLst/>
+          </a:prstGeom>
+        </p:spPr>
+      </p:pic>
+    </p:spTree>
+    <p:extLst>
+      <p:ext uri="{BB962C8B-B14F-4D97-AF65-F5344CB8AC3E}">
+        <p14:creationId xmlns:p14="http://schemas.microsoft.com/office/powerpoint/2010/main" val="1427179181"/>
+      </p:ext>
+    </p:extLst>
+  </p:cSld>
+  <p:clrMapOvr>
+    <a:masterClrMapping/>
+  </p:clrMapOvr>
+</p:sld>
+</file>
+
+<file path=ppt/slides/slide11.xml><?xml version="1.0" encoding="utf-8"?>
+<p:sld xmlns:a="http://schemas.openxmlformats.org/drawingml/2006/main" xmlns:r="http://schemas.openxmlformats.org/officeDocument/2006/relationships" xmlns:p="http://schemas.openxmlformats.org/presentationml/2006/main">
+  <p:cSld>
+    <p:spTree>
+      <p:nvGrpSpPr>
+        <p:cNvPr id="1" name=""/>
+        <p:cNvGrpSpPr/>
+        <p:nvPr/>
+      </p:nvGrpSpPr>
+      <p:grpSpPr>
+        <a:xfrm>
+          <a:off x="0" y="0"/>
+          <a:ext cx="0" cy="0"/>
+          <a:chOff x="0" y="0"/>
+          <a:chExt cx="0" cy="0"/>
+        </a:xfrm>
+      </p:grpSpPr>
+      <p:sp>
+        <p:nvSpPr>
+          <p:cNvPr id="3" name="Title 2"/>
+          <p:cNvSpPr>
+            <a:spLocks noGrp="1"/>
+          </p:cNvSpPr>
+          <p:nvPr>
+            <p:ph type="title"/>
+          </p:nvPr>
+        </p:nvSpPr>
+        <p:spPr/>
+        <p:txBody>
+          <a:bodyPr/>
+          <a:lstStyle/>
+          <a:p>
+            <a:r>
+              <a:rPr lang="en-US" dirty="0" err="1" smtClean="0"/>
+              <a:t>JavaFX</a:t>
+            </a:r>
+            <a:r>
+              <a:rPr lang="en-US" dirty="0" smtClean="0"/>
+              <a:t> Scene Builder</a:t>
+            </a:r>
+            <a:endParaRPr lang="en-US" dirty="0"/>
+          </a:p>
+        </p:txBody>
+      </p:sp>
+      <p:pic>
+        <p:nvPicPr>
+          <p:cNvPr id="6" name="Picture 5"/>
+          <p:cNvPicPr>
+            <a:picLocks noChangeAspect="1"/>
+          </p:cNvPicPr>
+          <p:nvPr/>
+        </p:nvPicPr>
+        <p:blipFill>
+          <a:blip r:embed="rId3"/>
+          <a:stretch>
+            <a:fillRect/>
+          </a:stretch>
+        </p:blipFill>
+        <p:spPr>
+          <a:xfrm>
+            <a:off x="1215240" y="2257226"/>
+            <a:ext cx="6713519" cy="4331303"/>
+          </a:xfrm>
+          <a:prstGeom prst="rect">
+            <a:avLst/>
+          </a:prstGeom>
+        </p:spPr>
+      </p:pic>
+    </p:spTree>
+    <p:extLst>
+      <p:ext uri="{BB962C8B-B14F-4D97-AF65-F5344CB8AC3E}">
+        <p14:creationId xmlns:p14="http://schemas.microsoft.com/office/powerpoint/2010/main" val="2125045359"/>
+      </p:ext>
+    </p:extLst>
+  </p:cSld>
+  <p:clrMapOvr>
+    <a:masterClrMapping/>
+  </p:clrMapOvr>
+</p:sld>
+</file>
+
+<file path=ppt/slides/slide12.xml><?xml version="1.0" encoding="utf-8"?>
+<p:sld xmlns:a="http://schemas.openxmlformats.org/drawingml/2006/main" xmlns:r="http://schemas.openxmlformats.org/officeDocument/2006/relationships" xmlns:p="http://schemas.openxmlformats.org/presentationml/2006/main">
+  <p:cSld>
+    <p:spTree>
+      <p:nvGrpSpPr>
+        <p:cNvPr id="1" name=""/>
+        <p:cNvGrpSpPr/>
+        <p:nvPr/>
+      </p:nvGrpSpPr>
+      <p:grpSpPr>
+        <a:xfrm>
+          <a:off x="0" y="0"/>
+          <a:ext cx="0" cy="0"/>
+          <a:chOff x="0" y="0"/>
+          <a:chExt cx="0" cy="0"/>
+        </a:xfrm>
+      </p:grpSpPr>
+      <p:sp>
+        <p:nvSpPr>
+          <p:cNvPr id="3" name="Title 2"/>
+          <p:cNvSpPr>
+            <a:spLocks noGrp="1"/>
+          </p:cNvSpPr>
+          <p:nvPr>
+            <p:ph type="title"/>
+          </p:nvPr>
+        </p:nvSpPr>
+        <p:spPr/>
+        <p:txBody>
+          <a:bodyPr/>
+          <a:lstStyle/>
+          <a:p>
+            <a:r>
+              <a:rPr lang="en-US" dirty="0" err="1" smtClean="0"/>
+              <a:t>JavaFX</a:t>
+            </a:r>
+            <a:r>
+              <a:rPr lang="en-US" dirty="0" smtClean="0"/>
+              <a:t> Scene Builder</a:t>
+            </a:r>
+            <a:endParaRPr lang="en-US" dirty="0"/>
+          </a:p>
+        </p:txBody>
+      </p:sp>
+      <p:pic>
+        <p:nvPicPr>
+          <p:cNvPr id="4" name="Picture 3"/>
+          <p:cNvPicPr>
+            <a:picLocks noChangeAspect="1"/>
+          </p:cNvPicPr>
+          <p:nvPr/>
+        </p:nvPicPr>
+        <p:blipFill>
+          <a:blip r:embed="rId2"/>
+          <a:stretch>
+            <a:fillRect/>
+          </a:stretch>
+        </p:blipFill>
+        <p:spPr>
+          <a:xfrm>
+            <a:off x="1955350" y="2215127"/>
+            <a:ext cx="5217311" cy="4464068"/>
+          </a:xfrm>
+          <a:prstGeom prst="rect">
+            <a:avLst/>
+          </a:prstGeom>
+        </p:spPr>
+      </p:pic>
+    </p:spTree>
+    <p:extLst>
+      <p:ext uri="{BB962C8B-B14F-4D97-AF65-F5344CB8AC3E}">
+        <p14:creationId xmlns:p14="http://schemas.microsoft.com/office/powerpoint/2010/main" val="3403695162"/>
+      </p:ext>
+    </p:extLst>
+  </p:cSld>
+  <p:clrMapOvr>
+    <a:masterClrMapping/>
+  </p:clrMapOvr>
+</p:sld>
+</file>
+
+<file path=ppt/slides/slide13.xml><?xml version="1.0" encoding="utf-8"?>
+<p:sld xmlns:a="http://schemas.openxmlformats.org/drawingml/2006/main" xmlns:r="http://schemas.openxmlformats.org/officeDocument/2006/relationships" xmlns:p="http://schemas.openxmlformats.org/presentationml/2006/main">
+  <p:cSld>
+    <p:spTree>
+      <p:nvGrpSpPr>
+        <p:cNvPr id="1" name=""/>
+        <p:cNvGrpSpPr/>
+        <p:nvPr/>
+      </p:nvGrpSpPr>
+      <p:grpSpPr>
+        <a:xfrm>
+          <a:off x="0" y="0"/>
+          <a:ext cx="0" cy="0"/>
+          <a:chOff x="0" y="0"/>
+          <a:chExt cx="0" cy="0"/>
+        </a:xfrm>
+      </p:grpSpPr>
+      <p:sp>
+        <p:nvSpPr>
+          <p:cNvPr id="3" name="Title 2"/>
+          <p:cNvSpPr>
+            <a:spLocks noGrp="1"/>
+          </p:cNvSpPr>
+          <p:nvPr>
+            <p:ph type="title"/>
+          </p:nvPr>
+        </p:nvSpPr>
+        <p:spPr/>
+        <p:txBody>
+          <a:bodyPr/>
+          <a:lstStyle/>
+          <a:p>
+            <a:r>
+              <a:rPr lang="en-US" dirty="0" err="1" smtClean="0"/>
+              <a:t>Gradle</a:t>
+            </a:r>
+            <a:endParaRPr lang="en-US" dirty="0"/>
+          </a:p>
+        </p:txBody>
+      </p:sp>
+      <p:pic>
+        <p:nvPicPr>
+          <p:cNvPr id="5" name="Content Placeholder 4"/>
+          <p:cNvPicPr>
+            <a:picLocks noGrp="1" noChangeAspect="1"/>
+          </p:cNvPicPr>
+          <p:nvPr>
+            <p:ph idx="1"/>
+          </p:nvPr>
+        </p:nvPicPr>
+        <p:blipFill>
+          <a:blip r:embed="rId3"/>
+          <a:srcRect t="22911" b="22911"/>
+          <a:stretch>
+            <a:fillRect/>
+          </a:stretch>
+        </p:blipFill>
+        <p:spPr>
+          <a:xfrm>
+            <a:off x="779878" y="2560819"/>
+            <a:ext cx="7745505" cy="3877815"/>
+          </a:xfrm>
+        </p:spPr>
+      </p:pic>
+    </p:spTree>
+    <p:extLst>
+      <p:ext uri="{BB962C8B-B14F-4D97-AF65-F5344CB8AC3E}">
+        <p14:creationId xmlns:p14="http://schemas.microsoft.com/office/powerpoint/2010/main" val="4188043223"/>
+      </p:ext>
+    </p:extLst>
+  </p:cSld>
+  <p:clrMapOvr>
+    <a:masterClrMapping/>
+  </p:clrMapOvr>
+</p:sld>
+</file>
+
+<file path=ppt/slides/slide14.xml><?xml version="1.0" encoding="utf-8"?>
+<p:sld xmlns:a="http://schemas.openxmlformats.org/drawingml/2006/main" xmlns:r="http://schemas.openxmlformats.org/officeDocument/2006/relationships" xmlns:p="http://schemas.openxmlformats.org/presentationml/2006/main">
+  <p:cSld>
+    <p:spTree>
+      <p:nvGrpSpPr>
+        <p:cNvPr id="1" name=""/>
+        <p:cNvGrpSpPr/>
+        <p:nvPr/>
+      </p:nvGrpSpPr>
+      <p:grpSpPr>
+        <a:xfrm>
+          <a:off x="0" y="0"/>
+          <a:ext cx="0" cy="0"/>
+          <a:chOff x="0" y="0"/>
+          <a:chExt cx="0" cy="0"/>
+        </a:xfrm>
+      </p:grpSpPr>
+      <p:sp>
+        <p:nvSpPr>
           <p:cNvPr id="2" name="Content Placeholder 1"/>
           <p:cNvSpPr>
             <a:spLocks noGrp="1"/>
@@ -5763,7 +6503,7 @@
 </p:sld>
 </file>
 
-<file path=ppt/slides/slide11.xml><?xml version="1.0" encoding="utf-8"?>
+<file path=ppt/slides/slide15.xml><?xml version="1.0" encoding="utf-8"?>
 <p:sld xmlns:a="http://schemas.openxmlformats.org/drawingml/2006/main" xmlns:r="http://schemas.openxmlformats.org/officeDocument/2006/relationships" xmlns:p="http://schemas.openxmlformats.org/presentationml/2006/main">
   <p:cSld>
     <p:spTree>
@@ -5835,7 +6575,7 @@
 </p:sld>
 </file>
 
-<file path=ppt/slides/slide12.xml><?xml version="1.0" encoding="utf-8"?>
+<file path=ppt/slides/slide16.xml><?xml version="1.0" encoding="utf-8"?>
 <p:sld xmlns:a="http://schemas.openxmlformats.org/drawingml/2006/main" xmlns:r="http://schemas.openxmlformats.org/officeDocument/2006/relationships" xmlns:p="http://schemas.openxmlformats.org/presentationml/2006/main">
   <p:cSld>
     <p:spTree>
@@ -5865,44 +6605,78 @@
         <p:spPr/>
         <p:txBody>
           <a:bodyPr>
-            <a:normAutofit fontScale="92500" lnSpcReduction="10000"/>
+            <a:normAutofit fontScale="92500" lnSpcReduction="20000"/>
           </a:bodyPr>
           <a:lstStyle/>
           <a:p>
             <a:r>
               <a:rPr lang="en-US" dirty="0" smtClean="0"/>
-              <a:t>Build</a:t>
-            </a:r>
-          </a:p>
-          <a:p>
-            <a:r>
-              <a:rPr lang="en-US" dirty="0" smtClean="0"/>
-              <a:t>Deploy</a:t>
-            </a:r>
-          </a:p>
-          <a:p>
-            <a:r>
-              <a:rPr lang="en-US" dirty="0" smtClean="0"/>
-              <a:t>Source Control</a:t>
-            </a:r>
-          </a:p>
-          <a:p>
-            <a:r>
-              <a:rPr lang="en-US" dirty="0" smtClean="0"/>
-              <a:t>Dependency Injection</a:t>
-            </a:r>
-          </a:p>
-          <a:p>
-            <a:r>
-              <a:rPr lang="en-US" dirty="0" smtClean="0"/>
-              <a:t>Configuration</a:t>
-            </a:r>
-          </a:p>
-          <a:p>
-            <a:r>
-              <a:rPr lang="en-US" dirty="0" smtClean="0"/>
-              <a:t>String Translation</a:t>
-            </a:r>
+              <a:t>Build – </a:t>
+            </a:r>
+            <a:r>
+              <a:rPr lang="en-US" dirty="0" err="1" smtClean="0"/>
+              <a:t>Gradle</a:t>
+            </a:r>
+            <a:endParaRPr lang="en-US" dirty="0" smtClean="0"/>
+          </a:p>
+          <a:p>
+            <a:r>
+              <a:rPr lang="en-US" dirty="0" smtClean="0"/>
+              <a:t>Logging – SLF4J | Log4J | SLF4J façade for java logging</a:t>
+            </a:r>
+            <a:endParaRPr lang="en-US" dirty="0" smtClean="0"/>
+          </a:p>
+          <a:p>
+            <a:r>
+              <a:rPr lang="en-US" dirty="0" smtClean="0"/>
+              <a:t>Source </a:t>
+            </a:r>
+            <a:r>
+              <a:rPr lang="en-US" dirty="0" smtClean="0"/>
+              <a:t>Control - </a:t>
+            </a:r>
+            <a:r>
+              <a:rPr lang="en-US" dirty="0" err="1" smtClean="0"/>
+              <a:t>Git</a:t>
+            </a:r>
+            <a:endParaRPr lang="en-US" dirty="0" smtClean="0"/>
+          </a:p>
+          <a:p>
+            <a:r>
+              <a:rPr lang="en-US" dirty="0" smtClean="0"/>
+              <a:t>Dependency </a:t>
+            </a:r>
+            <a:r>
+              <a:rPr lang="en-US" dirty="0" smtClean="0"/>
+              <a:t>Injection - Spring</a:t>
+            </a:r>
+            <a:endParaRPr lang="en-US" dirty="0" smtClean="0"/>
+          </a:p>
+          <a:p>
+            <a:r>
+              <a:rPr lang="en-US" dirty="0" smtClean="0"/>
+              <a:t>Configuration – Spring, Custom build </a:t>
+            </a:r>
+            <a:r>
+              <a:rPr lang="en-US" dirty="0" err="1" smtClean="0"/>
+              <a:t>config</a:t>
+            </a:r>
+            <a:r>
+              <a:rPr lang="en-US" dirty="0" smtClean="0"/>
+              <a:t> class</a:t>
+            </a:r>
+            <a:endParaRPr lang="en-US" dirty="0" smtClean="0"/>
+          </a:p>
+          <a:p>
+            <a:r>
+              <a:rPr lang="en-US" dirty="0" smtClean="0"/>
+              <a:t>String </a:t>
+            </a:r>
+            <a:r>
+              <a:rPr lang="en-US" dirty="0" smtClean="0"/>
+              <a:t>Translation – String tables as java resource bundles</a:t>
+            </a:r>
+            <a:endParaRPr lang="en-US" dirty="0" smtClean="0"/>
           </a:p>
           <a:p>
             <a:r>
@@ -5911,27 +6685,48 @@
             </a:r>
             <a:r>
               <a:rPr lang="en-US" dirty="0" smtClean="0"/>
-              <a:t>Support</a:t>
-            </a:r>
-          </a:p>
-          <a:p>
-            <a:r>
-              <a:rPr lang="en-US" dirty="0" smtClean="0"/>
-              <a:t>Database Support</a:t>
+              <a:t>Support – Jersey library for server and client</a:t>
+            </a:r>
+          </a:p>
+          <a:p>
+            <a:r>
+              <a:rPr lang="en-US" dirty="0" smtClean="0"/>
+              <a:t>JSON Support – Jackson library</a:t>
             </a:r>
             <a:endParaRPr lang="en-US" dirty="0" smtClean="0"/>
           </a:p>
           <a:p>
             <a:r>
               <a:rPr lang="en-US" dirty="0" smtClean="0"/>
-              <a:t>Threading model – Asynchronous Support</a:t>
-            </a:r>
-          </a:p>
-          <a:p>
-            <a:r>
-              <a:rPr lang="en-US" dirty="0" smtClean="0"/>
-              <a:t>Form Validation</a:t>
-            </a:r>
+              <a:t>Database Support – Spring Data | Hibernate JPA | JDBC</a:t>
+            </a:r>
+            <a:endParaRPr lang="en-US" dirty="0" smtClean="0"/>
+          </a:p>
+          <a:p>
+            <a:r>
+              <a:rPr lang="en-US" dirty="0" smtClean="0"/>
+              <a:t>Asynchronous Calling – </a:t>
+            </a:r>
+            <a:r>
+              <a:rPr lang="en-US" dirty="0" err="1" smtClean="0"/>
+              <a:t>Completable</a:t>
+            </a:r>
+            <a:r>
+              <a:rPr lang="en-US" dirty="0" smtClean="0"/>
+              <a:t> Futures</a:t>
+            </a:r>
+            <a:endParaRPr lang="en-US" dirty="0" smtClean="0"/>
+          </a:p>
+          <a:p>
+            <a:r>
+              <a:rPr lang="en-US" dirty="0" smtClean="0"/>
+              <a:t>Form </a:t>
+            </a:r>
+            <a:r>
+              <a:rPr lang="en-US" dirty="0" smtClean="0"/>
+              <a:t>Validation – Custom Validators</a:t>
+            </a:r>
+            <a:endParaRPr lang="en-US" dirty="0" smtClean="0"/>
           </a:p>
           <a:p>
             <a:endParaRPr lang="en-US" dirty="0"/>
@@ -5974,7 +6769,7 @@
 </p:sld>
 </file>
 
-<file path=ppt/slides/slide13.xml><?xml version="1.0" encoding="utf-8"?>
+<file path=ppt/slides/slide17.xml><?xml version="1.0" encoding="utf-8"?>
 <p:sld xmlns:a="http://schemas.openxmlformats.org/drawingml/2006/main" xmlns:r="http://schemas.openxmlformats.org/officeDocument/2006/relationships" xmlns:p="http://schemas.openxmlformats.org/presentationml/2006/main">
   <p:cSld>
     <p:spTree>
@@ -6006,7 +6801,45 @@
           <a:bodyPr/>
           <a:lstStyle/>
           <a:p>
-            <a:endParaRPr lang="en-US"/>
+            <a:r>
+              <a:rPr lang="en-US" dirty="0" smtClean="0"/>
+              <a:t>Log in</a:t>
+            </a:r>
+          </a:p>
+          <a:p>
+            <a:r>
+              <a:rPr lang="en-US" dirty="0" smtClean="0"/>
+              <a:t>Refresh</a:t>
+            </a:r>
+          </a:p>
+          <a:p>
+            <a:r>
+              <a:rPr lang="en-US" dirty="0" smtClean="0"/>
+              <a:t>About</a:t>
+            </a:r>
+          </a:p>
+          <a:p>
+            <a:r>
+              <a:rPr lang="en-US" dirty="0" smtClean="0"/>
+              <a:t>Direct messaging</a:t>
+            </a:r>
+          </a:p>
+          <a:p>
+            <a:r>
+              <a:rPr lang="en-US" dirty="0" smtClean="0"/>
+              <a:t>Conversation history</a:t>
+            </a:r>
+          </a:p>
+          <a:p>
+            <a:r>
+              <a:rPr lang="en-US" dirty="0" smtClean="0"/>
+              <a:t>Basic </a:t>
+            </a:r>
+            <a:r>
+              <a:rPr lang="en-US" dirty="0" err="1" smtClean="0"/>
+              <a:t>Auth</a:t>
+            </a:r>
+            <a:endParaRPr lang="en-US" dirty="0"/>
           </a:p>
         </p:txBody>
       </p:sp>
@@ -6053,7 +6886,7 @@
 </p:sld>
 </file>
 
-<file path=ppt/slides/slide14.xml><?xml version="1.0" encoding="utf-8"?>
+<file path=ppt/slides/slide18.xml><?xml version="1.0" encoding="utf-8"?>
 <p:sld xmlns:a="http://schemas.openxmlformats.org/drawingml/2006/main" xmlns:r="http://schemas.openxmlformats.org/officeDocument/2006/relationships" xmlns:p="http://schemas.openxmlformats.org/presentationml/2006/main">
   <p:cSld>
     <p:spTree>
@@ -6618,12 +7451,12 @@
       </p:grpSpPr>
       <p:sp>
         <p:nvSpPr>
-          <p:cNvPr id="2" name="Content Placeholder 1"/>
-          <p:cNvSpPr>
-            <a:spLocks noGrp="1"/>
-          </p:cNvSpPr>
-          <p:nvPr>
-            <p:ph idx="1"/>
+          <p:cNvPr id="3" name="Title 2"/>
+          <p:cNvSpPr>
+            <a:spLocks noGrp="1"/>
+          </p:cNvSpPr>
+          <p:nvPr>
+            <p:ph type="title"/>
           </p:nvPr>
         </p:nvSpPr>
         <p:spPr/>
@@ -6632,67 +7465,41 @@
           <a:lstStyle/>
           <a:p>
             <a:r>
-              <a:rPr lang="en-US" dirty="0" err="1" smtClean="0"/>
-              <a:t>Kotlin</a:t>
-            </a:r>
-            <a:r>
-              <a:rPr lang="en-US" dirty="0" smtClean="0"/>
-              <a:t> – client and server</a:t>
-            </a:r>
-          </a:p>
-          <a:p>
-            <a:r>
-              <a:rPr lang="en-US" dirty="0" smtClean="0"/>
-              <a:t>Java – client and server</a:t>
-            </a:r>
-          </a:p>
-          <a:p>
-            <a:r>
-              <a:rPr lang="en-US" dirty="0" smtClean="0"/>
-              <a:t>SQL - database</a:t>
-            </a:r>
-          </a:p>
-          <a:p>
-            <a:r>
-              <a:rPr lang="en-US" dirty="0" smtClean="0"/>
-              <a:t>Groovy – build system</a:t>
-            </a:r>
-          </a:p>
-          <a:p>
-            <a:r>
-              <a:rPr lang="en-US" dirty="0" smtClean="0"/>
-              <a:t>JSON – data serialization</a:t>
-            </a:r>
-          </a:p>
-        </p:txBody>
-      </p:sp>
-      <p:sp>
-        <p:nvSpPr>
-          <p:cNvPr id="3" name="Title 2"/>
-          <p:cNvSpPr>
-            <a:spLocks noGrp="1"/>
-          </p:cNvSpPr>
-          <p:nvPr>
-            <p:ph type="title"/>
-          </p:nvPr>
-        </p:nvSpPr>
-        <p:spPr/>
-        <p:txBody>
-          <a:bodyPr/>
-          <a:lstStyle/>
-          <a:p>
-            <a:r>
-              <a:rPr lang="en-US" dirty="0" smtClean="0"/>
-              <a:t>Languages</a:t>
+              <a:rPr lang="en-US" dirty="0" smtClean="0"/>
+              <a:t>Systems Architecture</a:t>
             </a:r>
             <a:endParaRPr lang="en-US" dirty="0"/>
           </a:p>
         </p:txBody>
       </p:sp>
+      <p:pic>
+        <p:nvPicPr>
+          <p:cNvPr id="4" name="Picture 3"/>
+          <p:cNvPicPr>
+            <a:picLocks noChangeAspect="1"/>
+          </p:cNvPicPr>
+          <p:nvPr/>
+        </p:nvPicPr>
+        <p:blipFill>
+          <a:blip r:embed="rId2"/>
+          <a:stretch>
+            <a:fillRect/>
+          </a:stretch>
+        </p:blipFill>
+        <p:spPr>
+          <a:xfrm>
+            <a:off x="879604" y="3104559"/>
+            <a:ext cx="7145648" cy="2801462"/>
+          </a:xfrm>
+          <a:prstGeom prst="rect">
+            <a:avLst/>
+          </a:prstGeom>
+        </p:spPr>
+      </p:pic>
     </p:spTree>
     <p:extLst>
       <p:ext uri="{BB962C8B-B14F-4D97-AF65-F5344CB8AC3E}">
-        <p14:creationId xmlns:p14="http://schemas.microsoft.com/office/powerpoint/2010/main" val="2546911323"/>
+        <p14:creationId xmlns:p14="http://schemas.microsoft.com/office/powerpoint/2010/main" val="2727699172"/>
       </p:ext>
     </p:extLst>
   </p:cSld>
@@ -6721,12 +7528,12 @@
       </p:grpSpPr>
       <p:sp>
         <p:nvSpPr>
-          <p:cNvPr id="2" name="Content Placeholder 1"/>
-          <p:cNvSpPr>
-            <a:spLocks noGrp="1"/>
-          </p:cNvSpPr>
-          <p:nvPr>
-            <p:ph idx="1"/>
+          <p:cNvPr id="3" name="Title 2"/>
+          <p:cNvSpPr>
+            <a:spLocks noGrp="1"/>
+          </p:cNvSpPr>
+          <p:nvPr>
+            <p:ph type="title"/>
           </p:nvPr>
         </p:nvSpPr>
         <p:spPr/>
@@ -6735,75 +7542,41 @@
           <a:lstStyle/>
           <a:p>
             <a:r>
-              <a:rPr lang="en-US" dirty="0" err="1" smtClean="0"/>
-              <a:t>Intellij</a:t>
-            </a:r>
-            <a:endParaRPr lang="en-US" dirty="0" smtClean="0"/>
-          </a:p>
-          <a:p>
-            <a:r>
-              <a:rPr lang="en-US" dirty="0" err="1" smtClean="0"/>
-              <a:t>JavaFX</a:t>
-            </a:r>
-            <a:r>
-              <a:rPr lang="en-US" dirty="0" smtClean="0"/>
-              <a:t> Scene Builder</a:t>
-            </a:r>
-            <a:endParaRPr lang="en-US" dirty="0" smtClean="0"/>
-          </a:p>
-          <a:p>
-            <a:r>
-              <a:rPr lang="en-US" dirty="0" err="1" smtClean="0"/>
-              <a:t>Gradle</a:t>
-            </a:r>
-            <a:endParaRPr lang="en-US" dirty="0" smtClean="0"/>
-          </a:p>
-          <a:p>
-            <a:r>
-              <a:rPr lang="en-US" dirty="0" err="1" smtClean="0"/>
-              <a:t>Github</a:t>
-            </a:r>
-            <a:endParaRPr lang="en-US" dirty="0" smtClean="0"/>
-          </a:p>
-          <a:p>
-            <a:r>
-              <a:rPr lang="en-US" dirty="0" err="1" smtClean="0"/>
-              <a:t>SmartGit</a:t>
-            </a:r>
-            <a:endParaRPr lang="en-US" dirty="0" smtClean="0"/>
-          </a:p>
-          <a:p>
-            <a:endParaRPr lang="en-US" dirty="0"/>
-          </a:p>
-        </p:txBody>
-      </p:sp>
-      <p:sp>
-        <p:nvSpPr>
-          <p:cNvPr id="3" name="Title 2"/>
-          <p:cNvSpPr>
-            <a:spLocks noGrp="1"/>
-          </p:cNvSpPr>
-          <p:nvPr>
-            <p:ph type="title"/>
-          </p:nvPr>
-        </p:nvSpPr>
-        <p:spPr/>
-        <p:txBody>
-          <a:bodyPr/>
-          <a:lstStyle/>
-          <a:p>
-            <a:r>
-              <a:rPr lang="en-US" dirty="0" smtClean="0"/>
-              <a:t>Tool Set</a:t>
-            </a:r>
-            <a:endParaRPr lang="en-US" dirty="0"/>
-          </a:p>
-        </p:txBody>
-      </p:sp>
+              <a:rPr lang="en-US" sz="4400" dirty="0" smtClean="0"/>
+              <a:t>Server Software Architecture</a:t>
+            </a:r>
+            <a:endParaRPr lang="en-US" sz="4400" dirty="0"/>
+          </a:p>
+        </p:txBody>
+      </p:sp>
+      <p:pic>
+        <p:nvPicPr>
+          <p:cNvPr id="4" name="Picture 3"/>
+          <p:cNvPicPr>
+            <a:picLocks noChangeAspect="1"/>
+          </p:cNvPicPr>
+          <p:nvPr/>
+        </p:nvPicPr>
+        <p:blipFill>
+          <a:blip r:embed="rId3"/>
+          <a:stretch>
+            <a:fillRect/>
+          </a:stretch>
+        </p:blipFill>
+        <p:spPr>
+          <a:xfrm>
+            <a:off x="190500" y="3290619"/>
+            <a:ext cx="8750300" cy="1841500"/>
+          </a:xfrm>
+          <a:prstGeom prst="rect">
+            <a:avLst/>
+          </a:prstGeom>
+        </p:spPr>
+      </p:pic>
     </p:spTree>
     <p:extLst>
       <p:ext uri="{BB962C8B-B14F-4D97-AF65-F5344CB8AC3E}">
-        <p14:creationId xmlns:p14="http://schemas.microsoft.com/office/powerpoint/2010/main" val="680281109"/>
+        <p14:creationId xmlns:p14="http://schemas.microsoft.com/office/powerpoint/2010/main" val="2725119868"/>
       </p:ext>
     </p:extLst>
   </p:cSld>
@@ -6846,10 +7619,10 @@
           <a:lstStyle/>
           <a:p>
             <a:r>
-              <a:rPr lang="en-US" dirty="0" err="1" smtClean="0"/>
-              <a:t>IntelliJ</a:t>
-            </a:r>
-            <a:endParaRPr lang="en-US" dirty="0"/>
+              <a:rPr lang="en-US" sz="4400" dirty="0" smtClean="0"/>
+              <a:t>Client Software Architecture</a:t>
+            </a:r>
+            <a:endParaRPr lang="en-US" sz="4400" dirty="0"/>
           </a:p>
         </p:txBody>
       </p:sp>
@@ -6869,8 +7642,8 @@
         </p:blipFill>
         <p:spPr>
           <a:xfrm>
-            <a:off x="788998" y="2415864"/>
-            <a:ext cx="7572411" cy="4152995"/>
+            <a:off x="215900" y="3292548"/>
+            <a:ext cx="8699500" cy="1828800"/>
           </a:xfrm>
           <a:prstGeom prst="rect">
             <a:avLst/>
@@ -6880,7 +7653,7 @@
     </p:spTree>
     <p:extLst>
       <p:ext uri="{BB962C8B-B14F-4D97-AF65-F5344CB8AC3E}">
-        <p14:creationId xmlns:p14="http://schemas.microsoft.com/office/powerpoint/2010/main" val="1427179181"/>
+        <p14:creationId xmlns:p14="http://schemas.microsoft.com/office/powerpoint/2010/main" val="3121411416"/>
       </p:ext>
     </p:extLst>
   </p:cSld>
@@ -6923,12 +7696,8 @@
           <a:lstStyle/>
           <a:p>
             <a:r>
-              <a:rPr lang="en-US" dirty="0" err="1" smtClean="0"/>
-              <a:t>JavaFX</a:t>
-            </a:r>
-            <a:r>
-              <a:rPr lang="en-US" dirty="0" smtClean="0"/>
-              <a:t> Scene Builder</a:t>
+              <a:rPr lang="en-US" dirty="0" smtClean="0"/>
+              <a:t>Data Model</a:t>
             </a:r>
             <a:endParaRPr lang="en-US" dirty="0"/>
           </a:p>
@@ -6936,22 +7705,22 @@
       </p:sp>
       <p:pic>
         <p:nvPicPr>
-          <p:cNvPr id="6" name="Picture 5"/>
+          <p:cNvPr id="5" name="Picture 4"/>
           <p:cNvPicPr>
             <a:picLocks noChangeAspect="1"/>
           </p:cNvPicPr>
           <p:nvPr/>
         </p:nvPicPr>
         <p:blipFill>
-          <a:blip r:embed="rId3"/>
+          <a:blip r:embed="rId2"/>
           <a:stretch>
             <a:fillRect/>
           </a:stretch>
         </p:blipFill>
         <p:spPr>
           <a:xfrm>
-            <a:off x="1215240" y="2257226"/>
-            <a:ext cx="6713519" cy="4331303"/>
+            <a:off x="3295771" y="2459393"/>
+            <a:ext cx="2556122" cy="3787614"/>
           </a:xfrm>
           <a:prstGeom prst="rect">
             <a:avLst/>
@@ -6961,7 +7730,7 @@
     </p:spTree>
     <p:extLst>
       <p:ext uri="{BB962C8B-B14F-4D97-AF65-F5344CB8AC3E}">
-        <p14:creationId xmlns:p14="http://schemas.microsoft.com/office/powerpoint/2010/main" val="2125045359"/>
+        <p14:creationId xmlns:p14="http://schemas.microsoft.com/office/powerpoint/2010/main" val="702133639"/>
       </p:ext>
     </p:extLst>
   </p:cSld>
@@ -6990,12 +7759,12 @@
       </p:grpSpPr>
       <p:sp>
         <p:nvSpPr>
-          <p:cNvPr id="3" name="Title 2"/>
-          <p:cNvSpPr>
-            <a:spLocks noGrp="1"/>
-          </p:cNvSpPr>
-          <p:nvPr>
-            <p:ph type="title"/>
+          <p:cNvPr id="2" name="Content Placeholder 1"/>
+          <p:cNvSpPr>
+            <a:spLocks noGrp="1"/>
+          </p:cNvSpPr>
+          <p:nvPr>
+            <p:ph idx="1"/>
           </p:nvPr>
         </p:nvSpPr>
         <p:spPr/>
@@ -7005,44 +7774,66 @@
           <a:p>
             <a:r>
               <a:rPr lang="en-US" dirty="0" err="1" smtClean="0"/>
-              <a:t>JavaFX</a:t>
-            </a:r>
-            <a:r>
-              <a:rPr lang="en-US" dirty="0" smtClean="0"/>
-              <a:t> Scene Builder</a:t>
+              <a:t>Kotlin</a:t>
+            </a:r>
+            <a:r>
+              <a:rPr lang="en-US" dirty="0" smtClean="0"/>
+              <a:t> – client and server</a:t>
+            </a:r>
+          </a:p>
+          <a:p>
+            <a:r>
+              <a:rPr lang="en-US" dirty="0" smtClean="0"/>
+              <a:t>Java – client and server</a:t>
+            </a:r>
+          </a:p>
+          <a:p>
+            <a:r>
+              <a:rPr lang="en-US" dirty="0" smtClean="0"/>
+              <a:t>SQL - database</a:t>
+            </a:r>
+          </a:p>
+          <a:p>
+            <a:r>
+              <a:rPr lang="en-US" dirty="0" smtClean="0"/>
+              <a:t>Groovy – build system</a:t>
+            </a:r>
+          </a:p>
+          <a:p>
+            <a:r>
+              <a:rPr lang="en-US" dirty="0" smtClean="0"/>
+              <a:t>JSON – data serialization</a:t>
+            </a:r>
+          </a:p>
+        </p:txBody>
+      </p:sp>
+      <p:sp>
+        <p:nvSpPr>
+          <p:cNvPr id="3" name="Title 2"/>
+          <p:cNvSpPr>
+            <a:spLocks noGrp="1"/>
+          </p:cNvSpPr>
+          <p:nvPr>
+            <p:ph type="title"/>
+          </p:nvPr>
+        </p:nvSpPr>
+        <p:spPr/>
+        <p:txBody>
+          <a:bodyPr/>
+          <a:lstStyle/>
+          <a:p>
+            <a:r>
+              <a:rPr lang="en-US" dirty="0" smtClean="0"/>
+              <a:t>Languages</a:t>
             </a:r>
             <a:endParaRPr lang="en-US" dirty="0"/>
           </a:p>
         </p:txBody>
       </p:sp>
-      <p:pic>
-        <p:nvPicPr>
-          <p:cNvPr id="4" name="Picture 3"/>
-          <p:cNvPicPr>
-            <a:picLocks noChangeAspect="1"/>
-          </p:cNvPicPr>
-          <p:nvPr/>
-        </p:nvPicPr>
-        <p:blipFill>
-          <a:blip r:embed="rId2"/>
-          <a:stretch>
-            <a:fillRect/>
-          </a:stretch>
-        </p:blipFill>
-        <p:spPr>
-          <a:xfrm>
-            <a:off x="1955350" y="2215127"/>
-            <a:ext cx="5217311" cy="4464068"/>
-          </a:xfrm>
-          <a:prstGeom prst="rect">
-            <a:avLst/>
-          </a:prstGeom>
-        </p:spPr>
-      </p:pic>
     </p:spTree>
     <p:extLst>
       <p:ext uri="{BB962C8B-B14F-4D97-AF65-F5344CB8AC3E}">
-        <p14:creationId xmlns:p14="http://schemas.microsoft.com/office/powerpoint/2010/main" val="3403695162"/>
+        <p14:creationId xmlns:p14="http://schemas.microsoft.com/office/powerpoint/2010/main" val="2546911323"/>
       </p:ext>
     </p:extLst>
   </p:cSld>
@@ -7071,12 +7862,12 @@
       </p:grpSpPr>
       <p:sp>
         <p:nvSpPr>
-          <p:cNvPr id="3" name="Title 2"/>
-          <p:cNvSpPr>
-            <a:spLocks noGrp="1"/>
-          </p:cNvSpPr>
-          <p:nvPr>
-            <p:ph type="title"/>
+          <p:cNvPr id="2" name="Content Placeholder 1"/>
+          <p:cNvSpPr>
+            <a:spLocks noGrp="1"/>
+          </p:cNvSpPr>
+          <p:nvPr>
+            <p:ph idx="1"/>
           </p:nvPr>
         </p:nvSpPr>
         <p:spPr/>
@@ -7086,40 +7877,74 @@
           <a:p>
             <a:r>
               <a:rPr lang="en-US" dirty="0" err="1" smtClean="0"/>
+              <a:t>Intellij</a:t>
+            </a:r>
+            <a:endParaRPr lang="en-US" dirty="0" smtClean="0"/>
+          </a:p>
+          <a:p>
+            <a:r>
+              <a:rPr lang="en-US" dirty="0" err="1" smtClean="0"/>
+              <a:t>JavaFX</a:t>
+            </a:r>
+            <a:r>
+              <a:rPr lang="en-US" dirty="0" smtClean="0"/>
+              <a:t> Scene Builder</a:t>
+            </a:r>
+            <a:endParaRPr lang="en-US" dirty="0" smtClean="0"/>
+          </a:p>
+          <a:p>
+            <a:r>
+              <a:rPr lang="en-US" dirty="0" err="1" smtClean="0"/>
               <a:t>Gradle</a:t>
             </a:r>
+            <a:endParaRPr lang="en-US" dirty="0" smtClean="0"/>
+          </a:p>
+          <a:p>
+            <a:r>
+              <a:rPr lang="en-US" dirty="0" err="1" smtClean="0"/>
+              <a:t>Github</a:t>
+            </a:r>
+            <a:endParaRPr lang="en-US" dirty="0" smtClean="0"/>
+          </a:p>
+          <a:p>
+            <a:r>
+              <a:rPr lang="en-US" dirty="0" err="1" smtClean="0"/>
+              <a:t>SmartGit</a:t>
+            </a:r>
+            <a:endParaRPr lang="en-US" dirty="0" smtClean="0"/>
+          </a:p>
+          <a:p>
             <a:endParaRPr lang="en-US" dirty="0"/>
           </a:p>
         </p:txBody>
       </p:sp>
-      <p:pic>
-        <p:nvPicPr>
-          <p:cNvPr id="5" name="Content Placeholder 4"/>
-          <p:cNvPicPr>
-            <a:picLocks noGrp="1" noChangeAspect="1"/>
-          </p:cNvPicPr>
-          <p:nvPr>
-            <p:ph idx="1"/>
-          </p:nvPr>
-        </p:nvPicPr>
-        <p:blipFill>
-          <a:blip r:embed="rId3"/>
-          <a:srcRect t="22911" b="22911"/>
-          <a:stretch>
-            <a:fillRect/>
-          </a:stretch>
-        </p:blipFill>
-        <p:spPr>
-          <a:xfrm>
-            <a:off x="779878" y="2560819"/>
-            <a:ext cx="7745505" cy="3877815"/>
-          </a:xfrm>
-        </p:spPr>
-      </p:pic>
+      <p:sp>
+        <p:nvSpPr>
+          <p:cNvPr id="3" name="Title 2"/>
+          <p:cNvSpPr>
+            <a:spLocks noGrp="1"/>
+          </p:cNvSpPr>
+          <p:nvPr>
+            <p:ph type="title"/>
+          </p:nvPr>
+        </p:nvSpPr>
+        <p:spPr/>
+        <p:txBody>
+          <a:bodyPr/>
+          <a:lstStyle/>
+          <a:p>
+            <a:r>
+              <a:rPr lang="en-US" dirty="0" smtClean="0"/>
+              <a:t>Tool Set</a:t>
+            </a:r>
+            <a:endParaRPr lang="en-US" dirty="0"/>
+          </a:p>
+        </p:txBody>
+      </p:sp>
     </p:spTree>
     <p:extLst>
       <p:ext uri="{BB962C8B-B14F-4D97-AF65-F5344CB8AC3E}">
-        <p14:creationId xmlns:p14="http://schemas.microsoft.com/office/powerpoint/2010/main" val="4188043223"/>
+        <p14:creationId xmlns:p14="http://schemas.microsoft.com/office/powerpoint/2010/main" val="680281109"/>
       </p:ext>
     </p:extLst>
   </p:cSld>

</xml_diff>